<commit_message>
Agregado resumen de la pagina 4 a la 6
</commit_message>
<xml_diff>
--- a/UI to User.pptx
+++ b/UI to User.pptx
@@ -12,20 +12,24 @@
     <p:sldId id="261" r:id="rId6"/>
     <p:sldId id="259" r:id="rId7"/>
     <p:sldId id="260" r:id="rId8"/>
-    <p:sldId id="262" r:id="rId9"/>
-    <p:sldId id="264" r:id="rId10"/>
-    <p:sldId id="265" r:id="rId11"/>
-    <p:sldId id="276" r:id="rId12"/>
-    <p:sldId id="266" r:id="rId13"/>
-    <p:sldId id="267" r:id="rId14"/>
-    <p:sldId id="268" r:id="rId15"/>
-    <p:sldId id="269" r:id="rId16"/>
-    <p:sldId id="270" r:id="rId17"/>
-    <p:sldId id="271" r:id="rId18"/>
-    <p:sldId id="272" r:id="rId19"/>
-    <p:sldId id="273" r:id="rId20"/>
-    <p:sldId id="274" r:id="rId21"/>
-    <p:sldId id="275" r:id="rId22"/>
+    <p:sldId id="277" r:id="rId9"/>
+    <p:sldId id="262" r:id="rId10"/>
+    <p:sldId id="264" r:id="rId11"/>
+    <p:sldId id="265" r:id="rId12"/>
+    <p:sldId id="276" r:id="rId13"/>
+    <p:sldId id="266" r:id="rId14"/>
+    <p:sldId id="267" r:id="rId15"/>
+    <p:sldId id="278" r:id="rId16"/>
+    <p:sldId id="268" r:id="rId17"/>
+    <p:sldId id="269" r:id="rId18"/>
+    <p:sldId id="270" r:id="rId19"/>
+    <p:sldId id="279" r:id="rId20"/>
+    <p:sldId id="272" r:id="rId21"/>
+    <p:sldId id="273" r:id="rId22"/>
+    <p:sldId id="274" r:id="rId23"/>
+    <p:sldId id="275" r:id="rId24"/>
+    <p:sldId id="280" r:id="rId25"/>
+    <p:sldId id="281" r:id="rId26"/>
   </p:sldIdLst>
   <p:sldSz cx="9144000" cy="6858000" type="screen4x3"/>
   <p:notesSz cx="6858000" cy="9144000"/>
@@ -308,7 +312,7 @@
           <a:p>
             <a:fld id="{55CFDE8C-D8D9-4F1A-9D99-296BB29DF6F6}" type="datetimeFigureOut">
               <a:rPr lang="es-ES" smtClean="0"/>
-              <a:t>16/03/2015</a:t>
+              <a:t>18/03/2015</a:t>
             </a:fld>
             <a:endParaRPr lang="es-ES"/>
           </a:p>
@@ -478,7 +482,7 @@
           <a:p>
             <a:fld id="{55CFDE8C-D8D9-4F1A-9D99-296BB29DF6F6}" type="datetimeFigureOut">
               <a:rPr lang="es-ES" smtClean="0"/>
-              <a:t>16/03/2015</a:t>
+              <a:t>18/03/2015</a:t>
             </a:fld>
             <a:endParaRPr lang="es-ES"/>
           </a:p>
@@ -658,7 +662,7 @@
           <a:p>
             <a:fld id="{55CFDE8C-D8D9-4F1A-9D99-296BB29DF6F6}" type="datetimeFigureOut">
               <a:rPr lang="es-ES" smtClean="0"/>
-              <a:t>16/03/2015</a:t>
+              <a:t>18/03/2015</a:t>
             </a:fld>
             <a:endParaRPr lang="es-ES"/>
           </a:p>
@@ -828,7 +832,7 @@
           <a:p>
             <a:fld id="{55CFDE8C-D8D9-4F1A-9D99-296BB29DF6F6}" type="datetimeFigureOut">
               <a:rPr lang="es-ES" smtClean="0"/>
-              <a:t>16/03/2015</a:t>
+              <a:t>18/03/2015</a:t>
             </a:fld>
             <a:endParaRPr lang="es-ES"/>
           </a:p>
@@ -1074,7 +1078,7 @@
           <a:p>
             <a:fld id="{55CFDE8C-D8D9-4F1A-9D99-296BB29DF6F6}" type="datetimeFigureOut">
               <a:rPr lang="es-ES" smtClean="0"/>
-              <a:t>16/03/2015</a:t>
+              <a:t>18/03/2015</a:t>
             </a:fld>
             <a:endParaRPr lang="es-ES"/>
           </a:p>
@@ -1362,7 +1366,7 @@
           <a:p>
             <a:fld id="{55CFDE8C-D8D9-4F1A-9D99-296BB29DF6F6}" type="datetimeFigureOut">
               <a:rPr lang="es-ES" smtClean="0"/>
-              <a:t>16/03/2015</a:t>
+              <a:t>18/03/2015</a:t>
             </a:fld>
             <a:endParaRPr lang="es-ES"/>
           </a:p>
@@ -1784,7 +1788,7 @@
           <a:p>
             <a:fld id="{55CFDE8C-D8D9-4F1A-9D99-296BB29DF6F6}" type="datetimeFigureOut">
               <a:rPr lang="es-ES" smtClean="0"/>
-              <a:t>16/03/2015</a:t>
+              <a:t>18/03/2015</a:t>
             </a:fld>
             <a:endParaRPr lang="es-ES"/>
           </a:p>
@@ -1902,7 +1906,7 @@
           <a:p>
             <a:fld id="{55CFDE8C-D8D9-4F1A-9D99-296BB29DF6F6}" type="datetimeFigureOut">
               <a:rPr lang="es-ES" smtClean="0"/>
-              <a:t>16/03/2015</a:t>
+              <a:t>18/03/2015</a:t>
             </a:fld>
             <a:endParaRPr lang="es-ES"/>
           </a:p>
@@ -1997,7 +2001,7 @@
           <a:p>
             <a:fld id="{55CFDE8C-D8D9-4F1A-9D99-296BB29DF6F6}" type="datetimeFigureOut">
               <a:rPr lang="es-ES" smtClean="0"/>
-              <a:t>16/03/2015</a:t>
+              <a:t>18/03/2015</a:t>
             </a:fld>
             <a:endParaRPr lang="es-ES"/>
           </a:p>
@@ -2274,7 +2278,7 @@
           <a:p>
             <a:fld id="{55CFDE8C-D8D9-4F1A-9D99-296BB29DF6F6}" type="datetimeFigureOut">
               <a:rPr lang="es-ES" smtClean="0"/>
-              <a:t>16/03/2015</a:t>
+              <a:t>18/03/2015</a:t>
             </a:fld>
             <a:endParaRPr lang="es-ES"/>
           </a:p>
@@ -2527,7 +2531,7 @@
           <a:p>
             <a:fld id="{55CFDE8C-D8D9-4F1A-9D99-296BB29DF6F6}" type="datetimeFigureOut">
               <a:rPr lang="es-ES" smtClean="0"/>
-              <a:t>16/03/2015</a:t>
+              <a:t>18/03/2015</a:t>
             </a:fld>
             <a:endParaRPr lang="es-ES"/>
           </a:p>
@@ -2740,7 +2744,7 @@
           <a:p>
             <a:fld id="{55CFDE8C-D8D9-4F1A-9D99-296BB29DF6F6}" type="datetimeFigureOut">
               <a:rPr lang="es-ES" smtClean="0"/>
-              <a:t>16/03/2015</a:t>
+              <a:t>18/03/2015</a:t>
             </a:fld>
             <a:endParaRPr lang="es-ES"/>
           </a:p>
@@ -3136,32 +3140,43 @@
           <a:lstStyle/>
           <a:p>
             <a:r>
-              <a:rPr lang="en-US" dirty="0" err="1" smtClean="0"/>
+              <a:rPr lang="en-US" sz="6600" dirty="0" err="1" smtClean="0"/>
               <a:t>Lanford</a:t>
             </a:r>
             <a:r>
-              <a:rPr lang="en-US" dirty="0" smtClean="0"/>
-              <a:t> Gabriel Murillo</a:t>
-            </a:r>
-          </a:p>
-          <a:p>
-            <a:r>
-              <a:rPr lang="en-US" dirty="0" smtClean="0"/>
+              <a:rPr lang="en-US" sz="6600" dirty="0" smtClean="0"/>
+              <a:t> Gabriel </a:t>
+            </a:r>
+            <a:r>
+              <a:rPr lang="en-US" sz="6600" dirty="0" smtClean="0"/>
+              <a:t>Murillo</a:t>
+            </a:r>
+          </a:p>
+          <a:p>
+            <a:r>
+              <a:rPr lang="en-US" sz="6600" dirty="0" smtClean="0"/>
+              <a:t>&amp;</a:t>
+            </a:r>
+            <a:endParaRPr lang="en-US" sz="6600" dirty="0" smtClean="0"/>
+          </a:p>
+          <a:p>
+            <a:r>
+              <a:rPr lang="en-US" sz="6600" dirty="0" smtClean="0"/>
               <a:t>Diego </a:t>
             </a:r>
             <a:r>
-              <a:rPr lang="en-US" dirty="0" err="1" smtClean="0"/>
+              <a:rPr lang="en-US" sz="6600" dirty="0" err="1" smtClean="0"/>
               <a:t>Artavia</a:t>
             </a:r>
             <a:r>
-              <a:rPr lang="en-US" dirty="0" smtClean="0"/>
+              <a:rPr lang="en-US" sz="6600" dirty="0" smtClean="0"/>
               <a:t> </a:t>
             </a:r>
             <a:r>
-              <a:rPr lang="en-US" dirty="0" err="1" smtClean="0"/>
+              <a:rPr lang="en-US" sz="6600" dirty="0" err="1" smtClean="0"/>
               <a:t>Chacón</a:t>
             </a:r>
-            <a:endParaRPr lang="es-ES" dirty="0"/>
+            <a:endParaRPr lang="es-ES" sz="6600" dirty="0"/>
           </a:p>
         </p:txBody>
       </p:sp>
@@ -3214,68 +3229,119 @@
         </p:nvSpPr>
         <p:spPr>
           <a:xfrm>
-            <a:off x="0" y="1340769"/>
-            <a:ext cx="6444208" cy="4608511"/>
+            <a:off x="0" y="0"/>
+            <a:ext cx="9144000" cy="6858000"/>
           </a:xfrm>
-          <a:solidFill>
-            <a:schemeClr val="bg1"/>
-          </a:solidFill>
+          <a:noFill/>
           <a:ln>
             <a:noFill/>
           </a:ln>
         </p:spPr>
         <p:txBody>
-          <a:bodyPr anchor="ctr"/>
-          <a:lstStyle/>
-          <a:p>
-            <a:r>
-              <a:rPr lang="es-CR" dirty="0" smtClean="0"/>
-              <a:t>Encontrar a algún hecho u objeto </a:t>
-            </a:r>
-          </a:p>
-          <a:p>
-            <a:r>
-              <a:rPr lang="es-CR" dirty="0" smtClean="0"/>
-              <a:t>Aprender algo </a:t>
-            </a:r>
-          </a:p>
-          <a:p>
-            <a:r>
-              <a:rPr lang="es-CR" dirty="0" smtClean="0"/>
-              <a:t>Realización de una transacción </a:t>
-            </a:r>
-          </a:p>
-          <a:p>
-            <a:r>
-              <a:rPr lang="es-CR" dirty="0" smtClean="0"/>
-              <a:t>Control o monitoreo algo </a:t>
-            </a:r>
-          </a:p>
-          <a:p>
-            <a:r>
-              <a:rPr lang="es-CR" dirty="0" smtClean="0"/>
-              <a:t>La creación de algo </a:t>
-            </a:r>
-          </a:p>
-          <a:p>
-            <a:r>
-              <a:rPr lang="es-CR" dirty="0" smtClean="0"/>
-              <a:t>Conversar con otras personas </a:t>
-            </a:r>
-          </a:p>
-          <a:p>
-            <a:r>
-              <a:rPr lang="es-CR" dirty="0" smtClean="0"/>
-              <a:t>Ser entretenido</a:t>
-            </a:r>
-            <a:endParaRPr lang="en-US" dirty="0" smtClean="0"/>
+          <a:bodyPr anchor="ctr">
+            <a:noAutofit/>
+          </a:bodyPr>
+          <a:lstStyle/>
+          <a:p>
+            <a:pPr marL="0" indent="0">
+              <a:buNone/>
+            </a:pPr>
+            <a:r>
+              <a:rPr lang="en-US" sz="4800" dirty="0" err="1" smtClean="0"/>
+              <a:t>Todos</a:t>
+            </a:r>
+            <a:r>
+              <a:rPr lang="en-US" sz="4800" dirty="0" smtClean="0"/>
+              <a:t> los </a:t>
+            </a:r>
+            <a:r>
+              <a:rPr lang="en-US" sz="4800" dirty="0" err="1" smtClean="0"/>
+              <a:t>que</a:t>
+            </a:r>
+            <a:r>
+              <a:rPr lang="en-US" sz="4800" dirty="0" smtClean="0"/>
+              <a:t> </a:t>
+            </a:r>
+            <a:r>
+              <a:rPr lang="en-US" sz="4800" dirty="0" err="1" smtClean="0"/>
+              <a:t>utilizamos</a:t>
+            </a:r>
+            <a:r>
+              <a:rPr lang="en-US" sz="4800" dirty="0" smtClean="0"/>
+              <a:t> </a:t>
+            </a:r>
+            <a:r>
+              <a:rPr lang="en-US" sz="4800" dirty="0" err="1" smtClean="0"/>
+              <a:t>una</a:t>
+            </a:r>
+            <a:r>
+              <a:rPr lang="en-US" sz="4800" dirty="0" smtClean="0"/>
+              <a:t> </a:t>
+            </a:r>
+            <a:r>
+              <a:rPr lang="en-US" sz="4800" dirty="0" err="1" smtClean="0"/>
+              <a:t>herramienta</a:t>
+            </a:r>
+            <a:r>
+              <a:rPr lang="en-US" sz="4800" dirty="0" smtClean="0"/>
+              <a:t> </a:t>
+            </a:r>
+            <a:r>
+              <a:rPr lang="en-US" sz="4800" dirty="0" err="1" smtClean="0"/>
+              <a:t>ya</a:t>
+            </a:r>
+            <a:r>
+              <a:rPr lang="en-US" sz="4800" dirty="0" smtClean="0"/>
+              <a:t> sea </a:t>
+            </a:r>
+            <a:r>
+              <a:rPr lang="en-US" sz="4800" dirty="0" smtClean="0"/>
+              <a:t>software </a:t>
+            </a:r>
+            <a:r>
+              <a:rPr lang="en-US" sz="4800" dirty="0" smtClean="0"/>
+              <a:t>o de </a:t>
+            </a:r>
+            <a:r>
+              <a:rPr lang="en-US" sz="4800" dirty="0" err="1" smtClean="0"/>
+              <a:t>otro</a:t>
+            </a:r>
+            <a:r>
+              <a:rPr lang="en-US" sz="4800" dirty="0" smtClean="0"/>
+              <a:t> </a:t>
+            </a:r>
+            <a:r>
+              <a:rPr lang="en-US" sz="4800" dirty="0" err="1" smtClean="0"/>
+              <a:t>tipo</a:t>
+            </a:r>
+            <a:r>
+              <a:rPr lang="en-US" sz="4800" dirty="0" smtClean="0"/>
+              <a:t>, lo </a:t>
+            </a:r>
+            <a:r>
+              <a:rPr lang="en-US" sz="4800" dirty="0" err="1" smtClean="0"/>
+              <a:t>hacemos</a:t>
+            </a:r>
+            <a:r>
+              <a:rPr lang="en-US" sz="4800" dirty="0" smtClean="0"/>
+              <a:t> con un </a:t>
+            </a:r>
+            <a:r>
+              <a:rPr lang="en-US" sz="4800" dirty="0" err="1" smtClean="0"/>
+              <a:t>motivo</a:t>
+            </a:r>
+            <a:r>
+              <a:rPr lang="en-US" sz="4800" dirty="0" smtClean="0"/>
+              <a:t>.</a:t>
+            </a:r>
+            <a:endParaRPr lang="es-ES" sz="4800" dirty="0" smtClean="0"/>
           </a:p>
         </p:txBody>
       </p:sp>
     </p:spTree>
     <p:extLst>
       <p:ext uri="{BB962C8B-B14F-4D97-AF65-F5344CB8AC3E}">
-        <p14:creationId xmlns:p14="http://schemas.microsoft.com/office/powerpoint/2010/main" val="705341053"/>
+        <p14:creationId xmlns:p14="http://schemas.microsoft.com/office/powerpoint/2010/main" val="4004824532"/>
       </p:ext>
     </p:extLst>
   </p:cSld>
@@ -3309,189 +3375,80 @@
           <a:chExt cx="0" cy="0"/>
         </a:xfrm>
       </p:grpSpPr>
-      <p:pic>
-        <p:nvPicPr>
-          <p:cNvPr id="5122" name="Picture 2" descr="C:\Users\Holtlanf999\Desktop\photo_why.png"/>
-          <p:cNvPicPr>
-            <a:picLocks noChangeAspect="1" noChangeArrowheads="1"/>
-          </p:cNvPicPr>
-          <p:nvPr/>
-        </p:nvPicPr>
-        <p:blipFill>
-          <a:blip r:embed="rId2">
-            <a:extLst>
-              <a:ext uri="{28A0092B-C50C-407E-A947-70E740481C1C}">
-                <a14:useLocalDpi xmlns:a14="http://schemas.microsoft.com/office/drawing/2010/main" val="0"/>
-              </a:ext>
-            </a:extLst>
-          </a:blip>
-          <a:srcRect/>
-          <a:stretch>
-            <a:fillRect/>
-          </a:stretch>
-        </p:blipFill>
-        <p:spPr bwMode="auto">
-          <a:xfrm>
-            <a:off x="794817" y="404664"/>
-            <a:ext cx="7935913" cy="5854700"/>
-          </a:xfrm>
-          <a:prstGeom prst="rect">
-            <a:avLst/>
-          </a:prstGeom>
-          <a:noFill/>
-          <a:extLst>
-            <a:ext uri="{909E8E84-426E-40DD-AFC4-6F175D3DCCD1}">
-              <a14:hiddenFill xmlns:a14="http://schemas.microsoft.com/office/drawing/2010/main">
-                <a:solidFill>
-                  <a:srgbClr val="FFFFFF"/>
-                </a:solidFill>
-              </a14:hiddenFill>
-            </a:ext>
-          </a:extLst>
-        </p:spPr>
-      </p:pic>
-      <p:sp>
-        <p:nvSpPr>
-          <p:cNvPr id="5" name="4 Rectángulo"/>
-          <p:cNvSpPr/>
-          <p:nvPr/>
+      <p:sp>
+        <p:nvSpPr>
+          <p:cNvPr id="3" name="2 Marcador de contenido"/>
+          <p:cNvSpPr>
+            <a:spLocks noGrp="1"/>
+          </p:cNvSpPr>
+          <p:nvPr>
+            <p:ph idx="1"/>
+          </p:nvPr>
         </p:nvSpPr>
         <p:spPr>
           <a:xfrm>
-            <a:off x="5497041" y="3861048"/>
-            <a:ext cx="144016" cy="144016"/>
+            <a:off x="0" y="1340769"/>
+            <a:ext cx="6444208" cy="4608511"/>
           </a:xfrm>
-          <a:prstGeom prst="rect">
-            <a:avLst/>
-          </a:prstGeom>
           <a:solidFill>
-            <a:schemeClr val="tx1"/>
+            <a:schemeClr val="bg1"/>
           </a:solidFill>
           <a:ln>
             <a:noFill/>
           </a:ln>
         </p:spPr>
-        <p:style>
-          <a:lnRef idx="2">
-            <a:schemeClr val="accent1">
-              <a:shade val="50000"/>
-            </a:schemeClr>
-          </a:lnRef>
-          <a:fillRef idx="1">
-            <a:schemeClr val="accent1"/>
-          </a:fillRef>
-          <a:effectRef idx="0">
-            <a:schemeClr val="accent1"/>
-          </a:effectRef>
-          <a:fontRef idx="minor">
-            <a:schemeClr val="lt1"/>
-          </a:fontRef>
-        </p:style>
-        <p:txBody>
-          <a:bodyPr rtlCol="0" anchor="ctr"/>
-          <a:lstStyle/>
-          <a:p>
-            <a:pPr algn="ctr"/>
-            <a:endParaRPr lang="es-ES"/>
-          </a:p>
-        </p:txBody>
-      </p:sp>
-      <p:sp>
-        <p:nvSpPr>
-          <p:cNvPr id="7" name="6 Rectángulo"/>
-          <p:cNvSpPr/>
-          <p:nvPr/>
-        </p:nvSpPr>
-        <p:spPr>
-          <a:xfrm>
-            <a:off x="5681488" y="3861048"/>
-            <a:ext cx="144016" cy="144016"/>
-          </a:xfrm>
-          <a:prstGeom prst="rect">
-            <a:avLst/>
-          </a:prstGeom>
-          <a:solidFill>
-            <a:schemeClr val="tx1"/>
-          </a:solidFill>
-          <a:ln>
-            <a:noFill/>
-          </a:ln>
-        </p:spPr>
-        <p:style>
-          <a:lnRef idx="2">
-            <a:schemeClr val="accent1">
-              <a:shade val="50000"/>
-            </a:schemeClr>
-          </a:lnRef>
-          <a:fillRef idx="1">
-            <a:schemeClr val="accent1"/>
-          </a:fillRef>
-          <a:effectRef idx="0">
-            <a:schemeClr val="accent1"/>
-          </a:effectRef>
-          <a:fontRef idx="minor">
-            <a:schemeClr val="lt1"/>
-          </a:fontRef>
-        </p:style>
-        <p:txBody>
-          <a:bodyPr rtlCol="0" anchor="ctr"/>
-          <a:lstStyle/>
-          <a:p>
-            <a:pPr algn="ctr"/>
-            <a:endParaRPr lang="es-ES"/>
-          </a:p>
-        </p:txBody>
-      </p:sp>
-      <p:sp>
-        <p:nvSpPr>
-          <p:cNvPr id="8" name="7 Rectángulo"/>
-          <p:cNvSpPr/>
-          <p:nvPr/>
-        </p:nvSpPr>
-        <p:spPr>
-          <a:xfrm>
-            <a:off x="5868144" y="3861048"/>
-            <a:ext cx="144016" cy="144016"/>
-          </a:xfrm>
-          <a:prstGeom prst="rect">
-            <a:avLst/>
-          </a:prstGeom>
-          <a:solidFill>
-            <a:schemeClr val="tx1"/>
-          </a:solidFill>
-          <a:ln>
-            <a:noFill/>
-          </a:ln>
-        </p:spPr>
-        <p:style>
-          <a:lnRef idx="2">
-            <a:schemeClr val="accent1">
-              <a:shade val="50000"/>
-            </a:schemeClr>
-          </a:lnRef>
-          <a:fillRef idx="1">
-            <a:schemeClr val="accent1"/>
-          </a:fillRef>
-          <a:effectRef idx="0">
-            <a:schemeClr val="accent1"/>
-          </a:effectRef>
-          <a:fontRef idx="minor">
-            <a:schemeClr val="lt1"/>
-          </a:fontRef>
-        </p:style>
-        <p:txBody>
-          <a:bodyPr rtlCol="0" anchor="ctr"/>
-          <a:lstStyle/>
-          <a:p>
-            <a:pPr algn="ctr"/>
-            <a:endParaRPr lang="es-ES"/>
+        <p:txBody>
+          <a:bodyPr anchor="ctr"/>
+          <a:lstStyle/>
+          <a:p>
+            <a:r>
+              <a:rPr lang="es-CR" dirty="0" smtClean="0"/>
+              <a:t>Encontrar a algún hecho u objeto. </a:t>
+            </a:r>
+          </a:p>
+          <a:p>
+            <a:r>
+              <a:rPr lang="es-CR" dirty="0" smtClean="0"/>
+              <a:t>Aprender algo. </a:t>
+            </a:r>
+          </a:p>
+          <a:p>
+            <a:r>
+              <a:rPr lang="es-CR" dirty="0" smtClean="0"/>
+              <a:t>Realizar una transacción.</a:t>
+            </a:r>
+          </a:p>
+          <a:p>
+            <a:r>
+              <a:rPr lang="es-CR" dirty="0" smtClean="0"/>
+              <a:t>Control o monitoreo algo. </a:t>
+            </a:r>
+          </a:p>
+          <a:p>
+            <a:r>
+              <a:rPr lang="es-CR" dirty="0" smtClean="0"/>
+              <a:t>La creación de algo. </a:t>
+            </a:r>
+          </a:p>
+          <a:p>
+            <a:r>
+              <a:rPr lang="es-CR" dirty="0" smtClean="0"/>
+              <a:t>Conversar con otras personas. </a:t>
+            </a:r>
+          </a:p>
+          <a:p>
+            <a:r>
+              <a:rPr lang="es-CR" dirty="0" smtClean="0"/>
+              <a:t>Entretenernos.</a:t>
+            </a:r>
+            <a:endParaRPr lang="en-US" dirty="0" smtClean="0"/>
           </a:p>
         </p:txBody>
       </p:sp>
     </p:spTree>
     <p:extLst>
       <p:ext uri="{BB962C8B-B14F-4D97-AF65-F5344CB8AC3E}">
-        <p14:creationId xmlns:p14="http://schemas.microsoft.com/office/powerpoint/2010/main" val="3224086752"/>
+        <p14:creationId xmlns:p14="http://schemas.microsoft.com/office/powerpoint/2010/main" val="705341053"/>
       </p:ext>
     </p:extLst>
   </p:cSld>
@@ -3527,71 +3484,579 @@
       </p:grpSpPr>
       <p:sp>
         <p:nvSpPr>
-          <p:cNvPr id="3" name="2 Marcador de contenido"/>
-          <p:cNvSpPr>
-            <a:spLocks noGrp="1"/>
-          </p:cNvSpPr>
-          <p:nvPr>
-            <p:ph idx="1"/>
-          </p:nvPr>
+          <p:cNvPr id="2" name="1 CuadroTexto"/>
+          <p:cNvSpPr txBox="1"/>
+          <p:nvPr/>
         </p:nvSpPr>
         <p:spPr>
           <a:xfrm>
-            <a:off x="277763" y="969622"/>
-            <a:ext cx="8964488" cy="4891211"/>
+            <a:off x="0" y="386626"/>
+            <a:ext cx="9144000" cy="1569660"/>
           </a:xfrm>
+          <a:prstGeom prst="rect">
+            <a:avLst/>
+          </a:prstGeom>
           <a:noFill/>
-          <a:ln>
-            <a:noFill/>
-          </a:ln>
         </p:spPr>
         <p:txBody>
-          <a:bodyPr anchor="ctr">
-            <a:normAutofit lnSpcReduction="10000"/>
+          <a:bodyPr wrap="square" rtlCol="0">
+            <a:spAutoFit/>
           </a:bodyPr>
           <a:lstStyle/>
           <a:p>
-            <a:pPr marL="0" indent="0">
-              <a:buNone/>
-            </a:pPr>
-            <a:r>
-              <a:rPr lang="es-CR" dirty="0" smtClean="0"/>
-              <a:t>El primer paso en el diseño de una interfaz es averiguar lo que los usuarios están tratando de lograr </a:t>
-            </a:r>
-            <a:r>
-              <a:rPr lang="es-CR" dirty="0" smtClean="0"/>
-              <a:t>realmente</a:t>
-            </a:r>
-            <a:r>
-              <a:rPr lang="es-CR" dirty="0" smtClean="0"/>
-              <a:t>. </a:t>
-            </a:r>
-          </a:p>
-          <a:p>
-            <a:pPr marL="0" indent="0">
-              <a:buNone/>
-            </a:pPr>
-            <a:r>
-              <a:rPr lang="es-CR" dirty="0" smtClean="0"/>
-              <a:t>Rellenar un formulario, por ejemplo, es casi nunca un objetivo en sí mismo ,  las personas sólo lo hacen porque están tratando de comprar algo en línea , renovar su licencia de conducir , o instalar el software.</a:t>
-            </a:r>
-          </a:p>
-          <a:p>
-            <a:pPr marL="0" indent="0">
-              <a:buNone/>
-            </a:pPr>
-            <a:r>
-              <a:rPr lang="es-CR" dirty="0" smtClean="0"/>
-              <a:t>El motivo real es la realización de algún tipo de transacción.</a:t>
-            </a:r>
-            <a:endParaRPr lang="en-US" dirty="0" smtClean="0"/>
+            <a:pPr algn="ctr"/>
+            <a:r>
+              <a:rPr lang="en-US" sz="9600" dirty="0" smtClean="0"/>
+              <a:t>¿</a:t>
+            </a:r>
+            <a:r>
+              <a:rPr lang="en-US" sz="9600" dirty="0" err="1" smtClean="0"/>
+              <a:t>Porque</a:t>
+            </a:r>
+            <a:r>
+              <a:rPr lang="en-US" sz="9600" dirty="0" smtClean="0"/>
+              <a:t>?</a:t>
+            </a:r>
+            <a:endParaRPr lang="es-ES" sz="9600" dirty="0"/>
+          </a:p>
+        </p:txBody>
+      </p:sp>
+      <p:sp>
+        <p:nvSpPr>
+          <p:cNvPr id="3" name="2 CuadroTexto"/>
+          <p:cNvSpPr txBox="1"/>
+          <p:nvPr/>
+        </p:nvSpPr>
+        <p:spPr>
+          <a:xfrm>
+            <a:off x="4257774" y="2057635"/>
+            <a:ext cx="2055316" cy="2554545"/>
+          </a:xfrm>
+          <a:prstGeom prst="rect">
+            <a:avLst/>
+          </a:prstGeom>
+          <a:noFill/>
+        </p:spPr>
+        <p:txBody>
+          <a:bodyPr wrap="square" rtlCol="0">
+            <a:spAutoFit/>
+          </a:bodyPr>
+          <a:lstStyle/>
+          <a:p>
+            <a:r>
+              <a:rPr lang="en-US" sz="16000" b="1" dirty="0" smtClean="0">
+                <a:solidFill>
+                  <a:srgbClr val="FF0000"/>
+                </a:solidFill>
+              </a:rPr>
+              <a:t>?</a:t>
+            </a:r>
+            <a:endParaRPr lang="es-ES" sz="16000" b="1" dirty="0">
+              <a:solidFill>
+                <a:srgbClr val="FF0000"/>
+              </a:solidFill>
+            </a:endParaRPr>
+          </a:p>
+        </p:txBody>
+      </p:sp>
+      <p:sp>
+        <p:nvSpPr>
+          <p:cNvPr id="11" name="10 CuadroTexto"/>
+          <p:cNvSpPr txBox="1"/>
+          <p:nvPr/>
+        </p:nvSpPr>
+        <p:spPr>
+          <a:xfrm rot="10800000">
+            <a:off x="2771800" y="2057635"/>
+            <a:ext cx="2055316" cy="2554545"/>
+          </a:xfrm>
+          <a:prstGeom prst="rect">
+            <a:avLst/>
+          </a:prstGeom>
+          <a:noFill/>
+        </p:spPr>
+        <p:txBody>
+          <a:bodyPr wrap="square" rtlCol="0">
+            <a:spAutoFit/>
+          </a:bodyPr>
+          <a:lstStyle/>
+          <a:p>
+            <a:r>
+              <a:rPr lang="en-US" sz="16000" b="1" dirty="0" smtClean="0">
+                <a:solidFill>
+                  <a:srgbClr val="FF0000"/>
+                </a:solidFill>
+              </a:rPr>
+              <a:t>?</a:t>
+            </a:r>
+            <a:endParaRPr lang="es-ES" sz="16000" b="1" dirty="0">
+              <a:solidFill>
+                <a:srgbClr val="FF0000"/>
+              </a:solidFill>
+            </a:endParaRPr>
+          </a:p>
+        </p:txBody>
+      </p:sp>
+      <p:sp>
+        <p:nvSpPr>
+          <p:cNvPr id="12" name="11 CuadroTexto"/>
+          <p:cNvSpPr txBox="1"/>
+          <p:nvPr/>
+        </p:nvSpPr>
+        <p:spPr>
+          <a:xfrm>
+            <a:off x="5508104" y="2057637"/>
+            <a:ext cx="2055316" cy="2554545"/>
+          </a:xfrm>
+          <a:prstGeom prst="rect">
+            <a:avLst/>
+          </a:prstGeom>
+          <a:noFill/>
+        </p:spPr>
+        <p:txBody>
+          <a:bodyPr wrap="square" rtlCol="0">
+            <a:spAutoFit/>
+          </a:bodyPr>
+          <a:lstStyle/>
+          <a:p>
+            <a:r>
+              <a:rPr lang="en-US" sz="16000" b="1" dirty="0" smtClean="0">
+                <a:solidFill>
+                  <a:srgbClr val="FF0000"/>
+                </a:solidFill>
+              </a:rPr>
+              <a:t>?</a:t>
+            </a:r>
+            <a:endParaRPr lang="es-ES" sz="16000" b="1" dirty="0">
+              <a:solidFill>
+                <a:srgbClr val="FF0000"/>
+              </a:solidFill>
+            </a:endParaRPr>
+          </a:p>
+        </p:txBody>
+      </p:sp>
+      <p:sp>
+        <p:nvSpPr>
+          <p:cNvPr id="13" name="12 CuadroTexto"/>
+          <p:cNvSpPr txBox="1"/>
+          <p:nvPr/>
+        </p:nvSpPr>
+        <p:spPr>
+          <a:xfrm rot="10800000">
+            <a:off x="4022130" y="2057637"/>
+            <a:ext cx="2055316" cy="2554545"/>
+          </a:xfrm>
+          <a:prstGeom prst="rect">
+            <a:avLst/>
+          </a:prstGeom>
+          <a:noFill/>
+        </p:spPr>
+        <p:txBody>
+          <a:bodyPr wrap="square" rtlCol="0">
+            <a:spAutoFit/>
+          </a:bodyPr>
+          <a:lstStyle/>
+          <a:p>
+            <a:r>
+              <a:rPr lang="en-US" sz="16000" b="1" dirty="0" smtClean="0">
+                <a:solidFill>
+                  <a:srgbClr val="FF0000"/>
+                </a:solidFill>
+              </a:rPr>
+              <a:t>?</a:t>
+            </a:r>
+            <a:endParaRPr lang="es-ES" sz="16000" b="1" dirty="0">
+              <a:solidFill>
+                <a:srgbClr val="FF0000"/>
+              </a:solidFill>
+            </a:endParaRPr>
+          </a:p>
+        </p:txBody>
+      </p:sp>
+      <p:sp>
+        <p:nvSpPr>
+          <p:cNvPr id="14" name="13 CuadroTexto"/>
+          <p:cNvSpPr txBox="1"/>
+          <p:nvPr/>
+        </p:nvSpPr>
+        <p:spPr>
+          <a:xfrm>
+            <a:off x="6743922" y="2083275"/>
+            <a:ext cx="2055316" cy="2554545"/>
+          </a:xfrm>
+          <a:prstGeom prst="rect">
+            <a:avLst/>
+          </a:prstGeom>
+          <a:noFill/>
+        </p:spPr>
+        <p:txBody>
+          <a:bodyPr wrap="square" rtlCol="0">
+            <a:spAutoFit/>
+          </a:bodyPr>
+          <a:lstStyle/>
+          <a:p>
+            <a:r>
+              <a:rPr lang="en-US" sz="16000" b="1" dirty="0" smtClean="0">
+                <a:solidFill>
+                  <a:srgbClr val="FF0000"/>
+                </a:solidFill>
+              </a:rPr>
+              <a:t>?</a:t>
+            </a:r>
+            <a:endParaRPr lang="es-ES" sz="16000" b="1" dirty="0">
+              <a:solidFill>
+                <a:srgbClr val="FF0000"/>
+              </a:solidFill>
+            </a:endParaRPr>
+          </a:p>
+        </p:txBody>
+      </p:sp>
+      <p:sp>
+        <p:nvSpPr>
+          <p:cNvPr id="15" name="14 CuadroTexto"/>
+          <p:cNvSpPr txBox="1"/>
+          <p:nvPr/>
+        </p:nvSpPr>
+        <p:spPr>
+          <a:xfrm rot="10800000">
+            <a:off x="5257948" y="2083275"/>
+            <a:ext cx="2055316" cy="2554545"/>
+          </a:xfrm>
+          <a:prstGeom prst="rect">
+            <a:avLst/>
+          </a:prstGeom>
+          <a:noFill/>
+        </p:spPr>
+        <p:txBody>
+          <a:bodyPr wrap="square" rtlCol="0">
+            <a:spAutoFit/>
+          </a:bodyPr>
+          <a:lstStyle/>
+          <a:p>
+            <a:r>
+              <a:rPr lang="en-US" sz="16000" b="1" dirty="0" smtClean="0">
+                <a:solidFill>
+                  <a:srgbClr val="FF0000"/>
+                </a:solidFill>
+              </a:rPr>
+              <a:t>?</a:t>
+            </a:r>
+            <a:endParaRPr lang="es-ES" sz="16000" b="1" dirty="0">
+              <a:solidFill>
+                <a:srgbClr val="FF0000"/>
+              </a:solidFill>
+            </a:endParaRPr>
+          </a:p>
+        </p:txBody>
+      </p:sp>
+      <p:sp>
+        <p:nvSpPr>
+          <p:cNvPr id="16" name="15 CuadroTexto"/>
+          <p:cNvSpPr txBox="1"/>
+          <p:nvPr/>
+        </p:nvSpPr>
+        <p:spPr>
+          <a:xfrm>
+            <a:off x="7963916" y="2083275"/>
+            <a:ext cx="2055316" cy="2554545"/>
+          </a:xfrm>
+          <a:prstGeom prst="rect">
+            <a:avLst/>
+          </a:prstGeom>
+          <a:noFill/>
+        </p:spPr>
+        <p:txBody>
+          <a:bodyPr wrap="square" rtlCol="0">
+            <a:spAutoFit/>
+          </a:bodyPr>
+          <a:lstStyle/>
+          <a:p>
+            <a:r>
+              <a:rPr lang="en-US" sz="16000" b="1" dirty="0" smtClean="0">
+                <a:solidFill>
+                  <a:srgbClr val="FF0000"/>
+                </a:solidFill>
+              </a:rPr>
+              <a:t>?</a:t>
+            </a:r>
+            <a:endParaRPr lang="es-ES" sz="16000" b="1" dirty="0">
+              <a:solidFill>
+                <a:srgbClr val="FF0000"/>
+              </a:solidFill>
+            </a:endParaRPr>
+          </a:p>
+        </p:txBody>
+      </p:sp>
+      <p:sp>
+        <p:nvSpPr>
+          <p:cNvPr id="17" name="16 CuadroTexto"/>
+          <p:cNvSpPr txBox="1"/>
+          <p:nvPr/>
+        </p:nvSpPr>
+        <p:spPr>
+          <a:xfrm rot="10800000">
+            <a:off x="6477942" y="2083275"/>
+            <a:ext cx="2055316" cy="2554545"/>
+          </a:xfrm>
+          <a:prstGeom prst="rect">
+            <a:avLst/>
+          </a:prstGeom>
+          <a:noFill/>
+        </p:spPr>
+        <p:txBody>
+          <a:bodyPr wrap="square" rtlCol="0">
+            <a:spAutoFit/>
+          </a:bodyPr>
+          <a:lstStyle/>
+          <a:p>
+            <a:r>
+              <a:rPr lang="en-US" sz="16000" b="1" dirty="0" smtClean="0">
+                <a:solidFill>
+                  <a:srgbClr val="FF0000"/>
+                </a:solidFill>
+              </a:rPr>
+              <a:t>?</a:t>
+            </a:r>
+            <a:endParaRPr lang="es-ES" sz="16000" b="1" dirty="0">
+              <a:solidFill>
+                <a:srgbClr val="FF0000"/>
+              </a:solidFill>
+            </a:endParaRPr>
+          </a:p>
+        </p:txBody>
+      </p:sp>
+      <p:sp>
+        <p:nvSpPr>
+          <p:cNvPr id="18" name="17 CuadroTexto"/>
+          <p:cNvSpPr txBox="1"/>
+          <p:nvPr/>
+        </p:nvSpPr>
+        <p:spPr>
+          <a:xfrm>
+            <a:off x="3014563" y="2045409"/>
+            <a:ext cx="2055316" cy="2554545"/>
+          </a:xfrm>
+          <a:prstGeom prst="rect">
+            <a:avLst/>
+          </a:prstGeom>
+          <a:noFill/>
+        </p:spPr>
+        <p:txBody>
+          <a:bodyPr wrap="square" rtlCol="0">
+            <a:spAutoFit/>
+          </a:bodyPr>
+          <a:lstStyle/>
+          <a:p>
+            <a:r>
+              <a:rPr lang="en-US" sz="16000" b="1" dirty="0" smtClean="0">
+                <a:solidFill>
+                  <a:srgbClr val="FF0000"/>
+                </a:solidFill>
+              </a:rPr>
+              <a:t>?</a:t>
+            </a:r>
+            <a:endParaRPr lang="es-ES" sz="16000" b="1" dirty="0">
+              <a:solidFill>
+                <a:srgbClr val="FF0000"/>
+              </a:solidFill>
+            </a:endParaRPr>
+          </a:p>
+        </p:txBody>
+      </p:sp>
+      <p:sp>
+        <p:nvSpPr>
+          <p:cNvPr id="19" name="18 CuadroTexto"/>
+          <p:cNvSpPr txBox="1"/>
+          <p:nvPr/>
+        </p:nvSpPr>
+        <p:spPr>
+          <a:xfrm rot="10800000">
+            <a:off x="1528589" y="2045409"/>
+            <a:ext cx="2055316" cy="2554545"/>
+          </a:xfrm>
+          <a:prstGeom prst="rect">
+            <a:avLst/>
+          </a:prstGeom>
+          <a:noFill/>
+        </p:spPr>
+        <p:txBody>
+          <a:bodyPr wrap="square" rtlCol="0">
+            <a:spAutoFit/>
+          </a:bodyPr>
+          <a:lstStyle/>
+          <a:p>
+            <a:r>
+              <a:rPr lang="en-US" sz="16000" b="1" dirty="0" smtClean="0">
+                <a:solidFill>
+                  <a:srgbClr val="FF0000"/>
+                </a:solidFill>
+              </a:rPr>
+              <a:t>?</a:t>
+            </a:r>
+            <a:endParaRPr lang="es-ES" sz="16000" b="1" dirty="0">
+              <a:solidFill>
+                <a:srgbClr val="FF0000"/>
+              </a:solidFill>
+            </a:endParaRPr>
+          </a:p>
+        </p:txBody>
+      </p:sp>
+      <p:sp>
+        <p:nvSpPr>
+          <p:cNvPr id="20" name="19 CuadroTexto"/>
+          <p:cNvSpPr txBox="1"/>
+          <p:nvPr/>
+        </p:nvSpPr>
+        <p:spPr>
+          <a:xfrm>
+            <a:off x="1744141" y="2045408"/>
+            <a:ext cx="2055316" cy="2554545"/>
+          </a:xfrm>
+          <a:prstGeom prst="rect">
+            <a:avLst/>
+          </a:prstGeom>
+          <a:noFill/>
+        </p:spPr>
+        <p:txBody>
+          <a:bodyPr wrap="square" rtlCol="0">
+            <a:spAutoFit/>
+          </a:bodyPr>
+          <a:lstStyle/>
+          <a:p>
+            <a:r>
+              <a:rPr lang="en-US" sz="16000" b="1" dirty="0" smtClean="0">
+                <a:solidFill>
+                  <a:srgbClr val="FF0000"/>
+                </a:solidFill>
+              </a:rPr>
+              <a:t>?</a:t>
+            </a:r>
+            <a:endParaRPr lang="es-ES" sz="16000" b="1" dirty="0">
+              <a:solidFill>
+                <a:srgbClr val="FF0000"/>
+              </a:solidFill>
+            </a:endParaRPr>
+          </a:p>
+        </p:txBody>
+      </p:sp>
+      <p:sp>
+        <p:nvSpPr>
+          <p:cNvPr id="21" name="20 CuadroTexto"/>
+          <p:cNvSpPr txBox="1"/>
+          <p:nvPr/>
+        </p:nvSpPr>
+        <p:spPr>
+          <a:xfrm rot="10800000">
+            <a:off x="258167" y="2045408"/>
+            <a:ext cx="2055316" cy="2554545"/>
+          </a:xfrm>
+          <a:prstGeom prst="rect">
+            <a:avLst/>
+          </a:prstGeom>
+          <a:noFill/>
+        </p:spPr>
+        <p:txBody>
+          <a:bodyPr wrap="square" rtlCol="0">
+            <a:spAutoFit/>
+          </a:bodyPr>
+          <a:lstStyle/>
+          <a:p>
+            <a:r>
+              <a:rPr lang="en-US" sz="16000" b="1" dirty="0" smtClean="0">
+                <a:solidFill>
+                  <a:srgbClr val="FF0000"/>
+                </a:solidFill>
+              </a:rPr>
+              <a:t>?</a:t>
+            </a:r>
+            <a:endParaRPr lang="es-ES" sz="16000" b="1" dirty="0">
+              <a:solidFill>
+                <a:srgbClr val="FF0000"/>
+              </a:solidFill>
+            </a:endParaRPr>
+          </a:p>
+        </p:txBody>
+      </p:sp>
+      <p:sp>
+        <p:nvSpPr>
+          <p:cNvPr id="22" name="21 CuadroTexto"/>
+          <p:cNvSpPr txBox="1"/>
+          <p:nvPr/>
+        </p:nvSpPr>
+        <p:spPr>
+          <a:xfrm>
+            <a:off x="499566" y="2083750"/>
+            <a:ext cx="2055316" cy="2554545"/>
+          </a:xfrm>
+          <a:prstGeom prst="rect">
+            <a:avLst/>
+          </a:prstGeom>
+          <a:noFill/>
+        </p:spPr>
+        <p:txBody>
+          <a:bodyPr wrap="square" rtlCol="0">
+            <a:spAutoFit/>
+          </a:bodyPr>
+          <a:lstStyle/>
+          <a:p>
+            <a:r>
+              <a:rPr lang="en-US" sz="16000" b="1" dirty="0" smtClean="0">
+                <a:solidFill>
+                  <a:srgbClr val="FF0000"/>
+                </a:solidFill>
+              </a:rPr>
+              <a:t>?</a:t>
+            </a:r>
+            <a:endParaRPr lang="es-ES" sz="16000" b="1" dirty="0">
+              <a:solidFill>
+                <a:srgbClr val="FF0000"/>
+              </a:solidFill>
+            </a:endParaRPr>
+          </a:p>
+        </p:txBody>
+      </p:sp>
+      <p:sp>
+        <p:nvSpPr>
+          <p:cNvPr id="23" name="22 CuadroTexto"/>
+          <p:cNvSpPr txBox="1"/>
+          <p:nvPr/>
+        </p:nvSpPr>
+        <p:spPr>
+          <a:xfrm rot="10800000">
+            <a:off x="-986408" y="2083750"/>
+            <a:ext cx="2055316" cy="2554545"/>
+          </a:xfrm>
+          <a:prstGeom prst="rect">
+            <a:avLst/>
+          </a:prstGeom>
+          <a:noFill/>
+        </p:spPr>
+        <p:txBody>
+          <a:bodyPr wrap="square" rtlCol="0">
+            <a:spAutoFit/>
+          </a:bodyPr>
+          <a:lstStyle/>
+          <a:p>
+            <a:r>
+              <a:rPr lang="en-US" sz="16000" b="1" dirty="0" smtClean="0">
+                <a:solidFill>
+                  <a:srgbClr val="FF0000"/>
+                </a:solidFill>
+              </a:rPr>
+              <a:t>?</a:t>
+            </a:r>
+            <a:endParaRPr lang="es-ES" sz="16000" b="1" dirty="0">
+              <a:solidFill>
+                <a:srgbClr val="FF0000"/>
+              </a:solidFill>
+            </a:endParaRPr>
           </a:p>
         </p:txBody>
       </p:sp>
     </p:spTree>
     <p:extLst>
       <p:ext uri="{BB962C8B-B14F-4D97-AF65-F5344CB8AC3E}">
-        <p14:creationId xmlns:p14="http://schemas.microsoft.com/office/powerpoint/2010/main" val="174407809"/>
+        <p14:creationId xmlns:p14="http://schemas.microsoft.com/office/powerpoint/2010/main" val="3224086752"/>
       </p:ext>
     </p:extLst>
   </p:cSld>
@@ -3637,12 +4102,18 @@
         </p:nvSpPr>
         <p:spPr>
           <a:xfrm>
-            <a:off x="0" y="0"/>
-            <a:ext cx="9144000" cy="6858000"/>
+            <a:off x="277763" y="969622"/>
+            <a:ext cx="8964488" cy="4891211"/>
           </a:xfrm>
+          <a:noFill/>
+          <a:ln>
+            <a:noFill/>
+          </a:ln>
         </p:spPr>
         <p:txBody>
-          <a:bodyPr anchor="ctr"/>
+          <a:bodyPr anchor="ctr">
+            <a:normAutofit lnSpcReduction="10000"/>
+          </a:bodyPr>
           <a:lstStyle/>
           <a:p>
             <a:pPr marL="0" indent="0">
@@ -3650,7 +4121,7 @@
             </a:pPr>
             <a:r>
               <a:rPr lang="es-CR" dirty="0" smtClean="0"/>
-              <a:t>Hacer las preguntas correctas ayuda a conectar los objetivos del usuario con el proceso de diseño . </a:t>
+              <a:t>El primer paso en el diseño de una interfaz es averiguar lo que los usuarios están tratando de lograr realmente. </a:t>
             </a:r>
           </a:p>
           <a:p>
@@ -3659,16 +4130,25 @@
             </a:pPr>
             <a:r>
               <a:rPr lang="es-CR" dirty="0" smtClean="0"/>
-              <a:t>Los clientes normalmente te hablan en soluciones deseadas , no de necesidades y problemas.</a:t>
-            </a:r>
-            <a:endParaRPr lang="es-ES" dirty="0"/>
+              <a:t>Rellenar un formulario, por ejemplo, es casi nunca un objetivo en sí mismo ,  las personas sólo lo hacen porque están tratando de comprar algo en línea , renovar su licencia de conducir , o instalar el software.</a:t>
+            </a:r>
+          </a:p>
+          <a:p>
+            <a:pPr marL="0" indent="0">
+              <a:buNone/>
+            </a:pPr>
+            <a:r>
+              <a:rPr lang="es-CR" dirty="0" smtClean="0"/>
+              <a:t>El motivo real es la realización de algún tipo de transacción.</a:t>
+            </a:r>
+            <a:endParaRPr lang="en-US" dirty="0" smtClean="0"/>
           </a:p>
         </p:txBody>
       </p:sp>
     </p:spTree>
     <p:extLst>
       <p:ext uri="{BB962C8B-B14F-4D97-AF65-F5344CB8AC3E}">
-        <p14:creationId xmlns:p14="http://schemas.microsoft.com/office/powerpoint/2010/main" val="3276854735"/>
+        <p14:creationId xmlns:p14="http://schemas.microsoft.com/office/powerpoint/2010/main" val="174407809"/>
       </p:ext>
     </p:extLst>
   </p:cSld>
@@ -3727,32 +4207,16 @@
             </a:pPr>
             <a:r>
               <a:rPr lang="es-CR" dirty="0" smtClean="0"/>
-              <a:t>Cuando un usuario o cliente dice que quiere una cierta característica , hay que preguntar </a:t>
-            </a:r>
+              <a:t>Hacer las preguntas correctas ayuda a conectar los objetivos del usuario con el proceso de diseño . </a:t>
+            </a:r>
+          </a:p>
+          <a:p>
+            <a:pPr marL="0" indent="0">
+              <a:buNone/>
+            </a:pPr>
             <a:r>
               <a:rPr lang="es-CR" dirty="0" smtClean="0"/>
-              <a:t>"¿por qué?" </a:t>
-            </a:r>
-            <a:r>
-              <a:rPr lang="es-CR" dirty="0" smtClean="0"/>
-              <a:t>la quiere, para determinar su objetivo inmediato . </a:t>
-            </a:r>
-          </a:p>
-          <a:p>
-            <a:pPr marL="0" indent="0">
-              <a:buNone/>
-            </a:pPr>
-            <a:r>
-              <a:rPr lang="es-CR" dirty="0" smtClean="0"/>
-              <a:t>Luego de la respuesta a esta pregunta , pregunta </a:t>
-            </a:r>
-            <a:r>
-              <a:rPr lang="es-CR" dirty="0" smtClean="0"/>
-              <a:t>"¿por qué?"</a:t>
-            </a:r>
-            <a:r>
-              <a:rPr lang="es-CR" dirty="0" smtClean="0"/>
-              <a:t> de nuevo. Sigue preguntando hasta llegar más allá de los límites del problema de diseño inmediato. </a:t>
+              <a:t>Los clientes normalmente te hablan en soluciones deseadas , no de necesidades y problemas.</a:t>
             </a:r>
             <a:endParaRPr lang="es-ES" dirty="0"/>
           </a:p>
@@ -3761,7 +4225,7 @@
     </p:spTree>
     <p:extLst>
       <p:ext uri="{BB962C8B-B14F-4D97-AF65-F5344CB8AC3E}">
-        <p14:creationId xmlns:p14="http://schemas.microsoft.com/office/powerpoint/2010/main" val="3066190928"/>
+        <p14:creationId xmlns:p14="http://schemas.microsoft.com/office/powerpoint/2010/main" val="3276854735"/>
       </p:ext>
     </p:extLst>
   </p:cSld>
@@ -3795,59 +4259,57 @@
           <a:chExt cx="0" cy="0"/>
         </a:xfrm>
       </p:grpSpPr>
-      <p:sp>
-        <p:nvSpPr>
-          <p:cNvPr id="3" name="2 Marcador de contenido"/>
-          <p:cNvSpPr>
-            <a:spLocks noGrp="1"/>
-          </p:cNvSpPr>
-          <p:nvPr>
-            <p:ph idx="1"/>
-          </p:nvPr>
-        </p:nvSpPr>
-        <p:spPr>
+      <p:pic>
+        <p:nvPicPr>
+          <p:cNvPr id="2050" name="Picture 2" descr="C:\Users\Holtlanf999\Downloads\15751521.jpg"/>
+          <p:cNvPicPr>
+            <a:picLocks noChangeAspect="1" noChangeArrowheads="1"/>
+          </p:cNvPicPr>
+          <p:nvPr/>
+        </p:nvPicPr>
+        <p:blipFill>
+          <a:blip r:embed="rId2">
+            <a:extLst>
+              <a:ext uri="{28A0092B-C50C-407E-A947-70E740481C1C}">
+                <a14:useLocalDpi xmlns:a14="http://schemas.microsoft.com/office/drawing/2010/main" val="0"/>
+              </a:ext>
+            </a:extLst>
+          </a:blip>
+          <a:srcRect/>
+          <a:stretch>
+            <a:fillRect/>
+          </a:stretch>
+        </p:blipFill>
+        <p:spPr bwMode="auto">
           <a:xfrm>
-            <a:off x="0" y="0"/>
-            <a:ext cx="9144000" cy="6858000"/>
+            <a:off x="1115616" y="0"/>
+            <a:ext cx="6839992" cy="6858000"/>
           </a:xfrm>
+          <a:prstGeom prst="rect">
+            <a:avLst/>
+          </a:prstGeom>
+          <a:noFill/>
+          <a:extLst>
+            <a:ext uri="{909E8E84-426E-40DD-AFC4-6F175D3DCCD1}">
+              <a14:hiddenFill xmlns:a14="http://schemas.microsoft.com/office/drawing/2010/main">
+                <a:solidFill>
+                  <a:srgbClr val="FFFFFF"/>
+                </a:solidFill>
+              </a14:hiddenFill>
+            </a:ext>
+          </a:extLst>
         </p:spPr>
-        <p:txBody>
-          <a:bodyPr anchor="ctr"/>
-          <a:lstStyle/>
-          <a:p>
-            <a:pPr marL="0" indent="0">
-              <a:buNone/>
-            </a:pPr>
-            <a:r>
-              <a:rPr lang="es-CR" dirty="0" smtClean="0"/>
-              <a:t>Es engañosamente fácil de modelar los usuarios como una única entidad- sin rostro " Pero esto no hará que los usuarios reflejen la realidad de lo que necesitan.</a:t>
-            </a:r>
-          </a:p>
-          <a:p>
-            <a:pPr marL="0" indent="0">
-              <a:buNone/>
-            </a:pPr>
-            <a:endParaRPr lang="es-ES" dirty="0"/>
-          </a:p>
-        </p:txBody>
-      </p:sp>
+      </p:pic>
     </p:spTree>
     <p:extLst>
       <p:ext uri="{BB962C8B-B14F-4D97-AF65-F5344CB8AC3E}">
-        <p14:creationId xmlns:p14="http://schemas.microsoft.com/office/powerpoint/2010/main" val="2556536078"/>
+        <p14:creationId xmlns:p14="http://schemas.microsoft.com/office/powerpoint/2010/main" val="1427739747"/>
       </p:ext>
     </p:extLst>
   </p:cSld>
   <p:clrMapOvr>
     <a:masterClrMapping/>
   </p:clrMapOvr>
-  <p:timing>
-    <p:tnLst>
-      <p:par>
-        <p:cTn id="1" dur="indefinite" restart="never" nodeType="tmRoot"/>
-      </p:par>
-    </p:tnLst>
-  </p:timing>
 </p:sld>
 </file>
 
@@ -3893,7 +4355,7 @@
             </a:pPr>
             <a:r>
               <a:rPr lang="es-CR" dirty="0" smtClean="0"/>
-              <a:t>Para hacer bien el diseño, se necesita tomar muchos factores "más suaves" en cuenta: reacciones , preferencias, contexto social , creencias y valores. </a:t>
+              <a:t>Cuando un usuario o cliente dice que quiere una cierta característica , hay que preguntar "¿por qué?" la quiere, para determinar su objetivo inmediato . </a:t>
             </a:r>
           </a:p>
           <a:p>
@@ -3902,99 +4364,8 @@
             </a:pPr>
             <a:r>
               <a:rPr lang="es-CR" dirty="0" smtClean="0"/>
-              <a:t>Todos estos factores podrían afectar el diseño de una aplicación o sitio. </a:t>
-            </a:r>
-          </a:p>
-          <a:p>
-            <a:pPr marL="0" indent="0">
-              <a:buNone/>
-            </a:pPr>
-            <a:r>
-              <a:rPr lang="es-CR" dirty="0" smtClean="0"/>
-              <a:t>Entre estos factores más suaves , es posible que la función crítica o factor de diseño que hace que su aplicación más atractiva y exitosa.</a:t>
-            </a:r>
-            <a:r>
-              <a:rPr lang="en-US" dirty="0" smtClean="0"/>
-              <a:t> </a:t>
-            </a:r>
-            <a:r>
-              <a:rPr lang="en-US" dirty="0" err="1" smtClean="0"/>
-              <a:t>Por</a:t>
-            </a:r>
-            <a:r>
-              <a:rPr lang="en-US" dirty="0" smtClean="0"/>
-              <a:t> </a:t>
-            </a:r>
-            <a:r>
-              <a:rPr lang="en-US" dirty="0" err="1" smtClean="0"/>
-              <a:t>eso</a:t>
-            </a:r>
-            <a:r>
-              <a:rPr lang="en-US" dirty="0" smtClean="0"/>
-              <a:t>, </a:t>
-            </a:r>
-            <a:r>
-              <a:rPr lang="en-US" dirty="0" err="1" smtClean="0"/>
-              <a:t>debemos</a:t>
-            </a:r>
-            <a:r>
-              <a:rPr lang="en-US" dirty="0" smtClean="0"/>
-              <a:t> </a:t>
-            </a:r>
-            <a:r>
-              <a:rPr lang="en-US" dirty="0" err="1" smtClean="0"/>
-              <a:t>enfocarnos</a:t>
-            </a:r>
-            <a:r>
-              <a:rPr lang="en-US" dirty="0" smtClean="0"/>
-              <a:t> en lo </a:t>
-            </a:r>
-            <a:r>
-              <a:rPr lang="en-US" dirty="0" err="1" smtClean="0"/>
-              <a:t>que</a:t>
-            </a:r>
-            <a:r>
-              <a:rPr lang="en-US" dirty="0" smtClean="0"/>
-              <a:t> el </a:t>
-            </a:r>
-            <a:r>
-              <a:rPr lang="en-US" dirty="0" err="1" smtClean="0"/>
-              <a:t>usuario</a:t>
-            </a:r>
-            <a:r>
-              <a:rPr lang="en-US" dirty="0" smtClean="0"/>
-              <a:t> </a:t>
-            </a:r>
-            <a:r>
-              <a:rPr lang="en-US" dirty="0" err="1" smtClean="0"/>
-              <a:t>realmente</a:t>
-            </a:r>
-            <a:r>
-              <a:rPr lang="en-US" dirty="0" smtClean="0"/>
-              <a:t> </a:t>
-            </a:r>
-            <a:r>
-              <a:rPr lang="en-US" dirty="0" err="1" smtClean="0"/>
-              <a:t>siente</a:t>
-            </a:r>
-            <a:r>
-              <a:rPr lang="en-US" dirty="0" smtClean="0"/>
-              <a:t> y </a:t>
-            </a:r>
-            <a:r>
-              <a:rPr lang="en-US" dirty="0" err="1" smtClean="0"/>
-              <a:t>necesita</a:t>
-            </a:r>
-            <a:r>
-              <a:rPr lang="en-US" dirty="0" smtClean="0"/>
-              <a:t>.</a:t>
-            </a:r>
-            <a:endParaRPr lang="es-ES" dirty="0" smtClean="0"/>
-          </a:p>
-          <a:p>
-            <a:pPr marL="0" indent="0">
-              <a:buNone/>
-            </a:pPr>
+              <a:t>Luego de la respuesta a esta pregunta , pregunta "¿por qué?" de nuevo. Sigue preguntando hasta llegar más allá de los límites del problema de diseño inmediato y tengas un panorama mas claro del asunto. </a:t>
+            </a:r>
             <a:endParaRPr lang="es-ES" dirty="0"/>
           </a:p>
         </p:txBody>
@@ -4002,7 +4373,7 @@
     </p:spTree>
     <p:extLst>
       <p:ext uri="{BB962C8B-B14F-4D97-AF65-F5344CB8AC3E}">
-        <p14:creationId xmlns:p14="http://schemas.microsoft.com/office/powerpoint/2010/main" val="1995503632"/>
+        <p14:creationId xmlns:p14="http://schemas.microsoft.com/office/powerpoint/2010/main" val="3066190928"/>
       </p:ext>
     </p:extLst>
   </p:cSld>
@@ -4059,6 +4430,24 @@
             <a:pPr marL="0" indent="0">
               <a:buNone/>
             </a:pPr>
+            <a:r>
+              <a:rPr lang="es-CR" dirty="0" smtClean="0"/>
+              <a:t>Es engañosamente fácil de modelar los usuarios </a:t>
+            </a:r>
+          </a:p>
+          <a:p>
+            <a:pPr marL="0" indent="0">
+              <a:buNone/>
+            </a:pPr>
+            <a:r>
+              <a:rPr lang="es-CR" dirty="0" smtClean="0"/>
+              <a:t>como una única entidad- sin rostro " Pero esto no hará que los usuarios reflejen la realidad de lo que necesitan.</a:t>
+            </a:r>
+          </a:p>
+          <a:p>
+            <a:pPr marL="0" indent="0">
+              <a:buNone/>
+            </a:pPr>
             <a:endParaRPr lang="es-ES" dirty="0"/>
           </a:p>
         </p:txBody>
@@ -4066,7 +4455,7 @@
     </p:spTree>
     <p:extLst>
       <p:ext uri="{BB962C8B-B14F-4D97-AF65-F5344CB8AC3E}">
-        <p14:creationId xmlns:p14="http://schemas.microsoft.com/office/powerpoint/2010/main" val="1527251458"/>
+        <p14:creationId xmlns:p14="http://schemas.microsoft.com/office/powerpoint/2010/main" val="2556536078"/>
       </p:ext>
     </p:extLst>
   </p:cSld>
@@ -4123,6 +4512,110 @@
             <a:pPr marL="0" indent="0">
               <a:buNone/>
             </a:pPr>
+            <a:r>
+              <a:rPr lang="es-CR" dirty="0" smtClean="0"/>
+              <a:t>Para hacer bien un diseño, se necesita tomar muchos factores "más suaves" en cuenta: reacciones , preferencias, contexto social , creencias y valores. </a:t>
+            </a:r>
+          </a:p>
+          <a:p>
+            <a:pPr marL="0" indent="0">
+              <a:buNone/>
+            </a:pPr>
+            <a:r>
+              <a:rPr lang="es-CR" dirty="0" smtClean="0"/>
+              <a:t>Todos esto podría afectar el diseño de una aplicación o sitio. </a:t>
+            </a:r>
+          </a:p>
+          <a:p>
+            <a:pPr marL="0" indent="0">
+              <a:buNone/>
+            </a:pPr>
+            <a:r>
+              <a:rPr lang="es-CR" dirty="0" smtClean="0"/>
+              <a:t>Entre estos factores más suaves , es posible que se encuentre la función crítica o factor de diseño que hace que su aplicación más atractiva y exitosa.</a:t>
+            </a:r>
+            <a:r>
+              <a:rPr lang="en-US" dirty="0" smtClean="0"/>
+              <a:t> </a:t>
+            </a:r>
+            <a:r>
+              <a:rPr lang="en-US" dirty="0" err="1" smtClean="0"/>
+              <a:t>Por</a:t>
+            </a:r>
+            <a:r>
+              <a:rPr lang="en-US" dirty="0" smtClean="0"/>
+              <a:t> </a:t>
+            </a:r>
+            <a:r>
+              <a:rPr lang="en-US" dirty="0" err="1" smtClean="0"/>
+              <a:t>eso</a:t>
+            </a:r>
+            <a:r>
+              <a:rPr lang="en-US" dirty="0" smtClean="0"/>
+              <a:t>, </a:t>
+            </a:r>
+            <a:r>
+              <a:rPr lang="en-US" dirty="0" err="1" smtClean="0"/>
+              <a:t>debemos</a:t>
+            </a:r>
+            <a:r>
+              <a:rPr lang="en-US" dirty="0" smtClean="0"/>
+              <a:t> </a:t>
+            </a:r>
+            <a:r>
+              <a:rPr lang="en-US" dirty="0" err="1" smtClean="0"/>
+              <a:t>enfocarnos</a:t>
+            </a:r>
+            <a:r>
+              <a:rPr lang="en-US" dirty="0" smtClean="0"/>
+              <a:t> en lo </a:t>
+            </a:r>
+            <a:r>
+              <a:rPr lang="en-US" dirty="0" err="1" smtClean="0"/>
+              <a:t>que</a:t>
+            </a:r>
+            <a:r>
+              <a:rPr lang="en-US" dirty="0" smtClean="0"/>
+              <a:t> el </a:t>
+            </a:r>
+            <a:r>
+              <a:rPr lang="en-US" dirty="0" err="1" smtClean="0"/>
+              <a:t>usuario</a:t>
+            </a:r>
+            <a:r>
+              <a:rPr lang="en-US" dirty="0" smtClean="0"/>
+              <a:t> </a:t>
+            </a:r>
+            <a:r>
+              <a:rPr lang="en-US" dirty="0" err="1" smtClean="0"/>
+              <a:t>realmente</a:t>
+            </a:r>
+            <a:r>
+              <a:rPr lang="en-US" dirty="0" smtClean="0"/>
+              <a:t> </a:t>
+            </a:r>
+            <a:r>
+              <a:rPr lang="en-US" dirty="0" err="1" smtClean="0"/>
+              <a:t>siente</a:t>
+            </a:r>
+            <a:r>
+              <a:rPr lang="en-US" dirty="0" smtClean="0"/>
+              <a:t> y </a:t>
+            </a:r>
+            <a:r>
+              <a:rPr lang="en-US" dirty="0" err="1" smtClean="0"/>
+              <a:t>necesita</a:t>
+            </a:r>
+            <a:r>
+              <a:rPr lang="en-US" dirty="0" smtClean="0"/>
+              <a:t>.</a:t>
+            </a:r>
+            <a:endParaRPr lang="es-ES" dirty="0" smtClean="0"/>
+          </a:p>
+          <a:p>
+            <a:pPr marL="0" indent="0">
+              <a:buNone/>
+            </a:pPr>
             <a:endParaRPr lang="es-ES" dirty="0"/>
           </a:p>
         </p:txBody>
@@ -4130,7 +4623,7 @@
     </p:spTree>
     <p:extLst>
       <p:ext uri="{BB962C8B-B14F-4D97-AF65-F5344CB8AC3E}">
-        <p14:creationId xmlns:p14="http://schemas.microsoft.com/office/powerpoint/2010/main" val="980575081"/>
+        <p14:creationId xmlns:p14="http://schemas.microsoft.com/office/powerpoint/2010/main" val="1995503632"/>
       </p:ext>
     </p:extLst>
   </p:cSld>
@@ -4164,9 +4657,50 @@
           <a:chExt cx="0" cy="0"/>
         </a:xfrm>
       </p:grpSpPr>
-      <p:sp>
-        <p:nvSpPr>
-          <p:cNvPr id="3" name="2 Marcador de contenido"/>
+      <p:pic>
+        <p:nvPicPr>
+          <p:cNvPr id="1026" name="Picture 2" descr="C:\Users\Holtlanf999\Desktop\detective.jpg"/>
+          <p:cNvPicPr>
+            <a:picLocks noChangeAspect="1" noChangeArrowheads="1"/>
+          </p:cNvPicPr>
+          <p:nvPr/>
+        </p:nvPicPr>
+        <p:blipFill>
+          <a:blip r:embed="rId2">
+            <a:extLst>
+              <a:ext uri="{28A0092B-C50C-407E-A947-70E740481C1C}">
+                <a14:useLocalDpi xmlns:a14="http://schemas.microsoft.com/office/drawing/2010/main" val="0"/>
+              </a:ext>
+            </a:extLst>
+          </a:blip>
+          <a:srcRect/>
+          <a:stretch>
+            <a:fillRect/>
+          </a:stretch>
+        </p:blipFill>
+        <p:spPr bwMode="auto">
+          <a:xfrm>
+            <a:off x="1437432" y="0"/>
+            <a:ext cx="6389441" cy="6858000"/>
+          </a:xfrm>
+          <a:prstGeom prst="rect">
+            <a:avLst/>
+          </a:prstGeom>
+          <a:noFill/>
+          <a:extLst>
+            <a:ext uri="{909E8E84-426E-40DD-AFC4-6F175D3DCCD1}">
+              <a14:hiddenFill xmlns:a14="http://schemas.microsoft.com/office/drawing/2010/main">
+                <a:solidFill>
+                  <a:srgbClr val="FFFFFF"/>
+                </a:solidFill>
+              </a14:hiddenFill>
+            </a:ext>
+          </a:extLst>
+        </p:spPr>
+      </p:pic>
+      <p:sp>
+        <p:nvSpPr>
+          <p:cNvPr id="5" name="2 Marcador de contenido"/>
           <p:cNvSpPr>
             <a:spLocks noGrp="1"/>
           </p:cNvSpPr>
@@ -4176,38 +4710,92 @@
         </p:nvSpPr>
         <p:spPr>
           <a:xfrm>
-            <a:off x="0" y="0"/>
+            <a:off x="179512" y="836712"/>
             <a:ext cx="9144000" cy="6858000"/>
           </a:xfrm>
         </p:spPr>
         <p:txBody>
-          <a:bodyPr anchor="ctr"/>
+          <a:bodyPr anchor="t">
+            <a:normAutofit/>
+          </a:bodyPr>
           <a:lstStyle/>
           <a:p>
             <a:pPr marL="0" indent="0">
               <a:buNone/>
             </a:pPr>
-            <a:endParaRPr lang="es-ES" dirty="0"/>
+            <a:r>
+              <a:rPr lang="en-US" sz="3600" dirty="0" smtClean="0"/>
+              <a:t>¿</a:t>
+            </a:r>
+            <a:r>
+              <a:rPr lang="en-US" sz="3600" dirty="0" err="1" smtClean="0"/>
+              <a:t>Que</a:t>
+            </a:r>
+            <a:r>
+              <a:rPr lang="en-US" sz="3600" dirty="0" smtClean="0"/>
+              <a:t> </a:t>
+            </a:r>
+            <a:r>
+              <a:rPr lang="en-US" sz="3600" dirty="0" err="1" smtClean="0"/>
+              <a:t>necesitas</a:t>
+            </a:r>
+            <a:r>
+              <a:rPr lang="en-US" sz="3600" dirty="0" smtClean="0"/>
+              <a:t> </a:t>
+            </a:r>
+            <a:endParaRPr lang="en-US" sz="3600" dirty="0" smtClean="0"/>
+          </a:p>
+          <a:p>
+            <a:pPr marL="0" indent="0">
+              <a:buNone/>
+            </a:pPr>
+            <a:r>
+              <a:rPr lang="en-US" sz="3600" dirty="0" smtClean="0"/>
+              <a:t>saber </a:t>
+            </a:r>
+            <a:r>
+              <a:rPr lang="en-US" sz="3600" dirty="0" err="1" smtClean="0"/>
+              <a:t>acerca</a:t>
+            </a:r>
+            <a:r>
+              <a:rPr lang="en-US" sz="3600" dirty="0" smtClean="0"/>
+              <a:t> </a:t>
+            </a:r>
+            <a:r>
+              <a:rPr lang="en-US" sz="3600" dirty="0" smtClean="0"/>
+              <a:t>del</a:t>
+            </a:r>
+          </a:p>
+          <a:p>
+            <a:pPr marL="0" indent="0">
+              <a:buNone/>
+            </a:pPr>
+            <a:r>
+              <a:rPr lang="en-US" sz="3600" dirty="0" smtClean="0"/>
+              <a:t> </a:t>
+            </a:r>
+            <a:r>
+              <a:rPr lang="en-US" sz="3600" dirty="0" err="1" smtClean="0"/>
+              <a:t>usuario</a:t>
+            </a:r>
+            <a:r>
+              <a:rPr lang="en-US" sz="3600" dirty="0" smtClean="0"/>
+              <a:t>?</a:t>
+            </a:r>
+            <a:endParaRPr lang="es-ES" sz="3600" dirty="0"/>
           </a:p>
         </p:txBody>
       </p:sp>
     </p:spTree>
     <p:extLst>
       <p:ext uri="{BB962C8B-B14F-4D97-AF65-F5344CB8AC3E}">
-        <p14:creationId xmlns:p14="http://schemas.microsoft.com/office/powerpoint/2010/main" val="2452590244"/>
+        <p14:creationId xmlns:p14="http://schemas.microsoft.com/office/powerpoint/2010/main" val="2525391350"/>
       </p:ext>
     </p:extLst>
   </p:cSld>
   <p:clrMapOvr>
     <a:masterClrMapping/>
   </p:clrMapOvr>
-  <p:timing>
-    <p:tnLst>
-      <p:par>
-        <p:cTn id="1" dur="indefinite" restart="never" nodeType="tmRoot"/>
-      </p:par>
-    </p:tnLst>
-  </p:timing>
 </p:sld>
 </file>
 
@@ -4251,7 +4839,7 @@
         </p:blipFill>
         <p:spPr bwMode="auto">
           <a:xfrm>
-            <a:off x="899592" y="980728"/>
+            <a:off x="899592" y="1268760"/>
             <a:ext cx="7679406" cy="4680781"/>
           </a:xfrm>
           <a:prstGeom prst="rect">
@@ -4269,6 +4857,37 @@
           </a:extLst>
         </p:spPr>
       </p:pic>
+      <p:sp>
+        <p:nvSpPr>
+          <p:cNvPr id="2" name="1 CuadroTexto"/>
+          <p:cNvSpPr txBox="1"/>
+          <p:nvPr/>
+        </p:nvSpPr>
+        <p:spPr>
+          <a:xfrm>
+            <a:off x="0" y="437763"/>
+            <a:ext cx="9144000" cy="1569660"/>
+          </a:xfrm>
+          <a:prstGeom prst="rect">
+            <a:avLst/>
+          </a:prstGeom>
+          <a:noFill/>
+        </p:spPr>
+        <p:txBody>
+          <a:bodyPr wrap="square" rtlCol="0">
+            <a:spAutoFit/>
+          </a:bodyPr>
+          <a:lstStyle/>
+          <a:p>
+            <a:pPr algn="ctr"/>
+            <a:r>
+              <a:rPr lang="en-US" sz="9600" dirty="0" smtClean="0"/>
+              <a:t>From UI 2 U</a:t>
+            </a:r>
+            <a:endParaRPr lang="es-ES" sz="9600" dirty="0"/>
+          </a:p>
+        </p:txBody>
+      </p:sp>
     </p:spTree>
     <p:extLst>
       <p:ext uri="{BB962C8B-B14F-4D97-AF65-F5344CB8AC3E}">
@@ -4329,6 +4948,58 @@
             <a:pPr marL="0" indent="0">
               <a:buNone/>
             </a:pPr>
+            <a:r>
+              <a:rPr lang="en-US" dirty="0" smtClean="0"/>
+              <a:t>Al </a:t>
+            </a:r>
+            <a:r>
+              <a:rPr lang="en-US" dirty="0" err="1" smtClean="0"/>
+              <a:t>comenzar</a:t>
+            </a:r>
+            <a:r>
+              <a:rPr lang="en-US" dirty="0" smtClean="0"/>
+              <a:t> un </a:t>
+            </a:r>
+            <a:r>
+              <a:rPr lang="en-US" dirty="0" err="1" smtClean="0"/>
+              <a:t>diseño</a:t>
+            </a:r>
+            <a:r>
+              <a:rPr lang="en-US" dirty="0" smtClean="0"/>
+              <a:t>, </a:t>
+            </a:r>
+            <a:r>
+              <a:rPr lang="es-CR" dirty="0" smtClean="0"/>
+              <a:t>tendrás </a:t>
+            </a:r>
+            <a:r>
+              <a:rPr lang="es-CR" dirty="0"/>
+              <a:t>que caracterizar el tipo de personas que van a </a:t>
+            </a:r>
+            <a:r>
+              <a:rPr lang="es-CR" dirty="0" smtClean="0"/>
+              <a:t>utilizarlo(incluyendo </a:t>
+            </a:r>
+            <a:r>
+              <a:rPr lang="es-CR" dirty="0"/>
+              <a:t>los factores más suaves que acabamos de mencionar), y la mejor manera de hacerlo es </a:t>
+            </a:r>
+            <a:r>
+              <a:rPr lang="es-CR" dirty="0" smtClean="0"/>
+              <a:t>salir a buscarlas y conocerlas. Da</a:t>
+            </a:r>
+            <a:r>
+              <a:rPr lang="es-CR" dirty="0" smtClean="0"/>
+              <a:t>do que cada usuario es </a:t>
+            </a:r>
+            <a:r>
+              <a:rPr lang="es-CR" dirty="0"/>
+              <a:t>ú</a:t>
+            </a:r>
+            <a:r>
+              <a:rPr lang="es-CR" dirty="0" smtClean="0"/>
+              <a:t>nico, y no podemos diseñar específicamente para todos los tipos de usuarios que usen nuestro diseño, el truco está en descubrir que es generalmente cierto acerca de nuestros usuarios.</a:t>
+            </a:r>
             <a:endParaRPr lang="es-ES" dirty="0"/>
           </a:p>
         </p:txBody>
@@ -4336,7 +5007,7 @@
     </p:spTree>
     <p:extLst>
       <p:ext uri="{BB962C8B-B14F-4D97-AF65-F5344CB8AC3E}">
-        <p14:creationId xmlns:p14="http://schemas.microsoft.com/office/powerpoint/2010/main" val="4061530428"/>
+        <p14:creationId xmlns:p14="http://schemas.microsoft.com/office/powerpoint/2010/main" val="980575081"/>
       </p:ext>
     </p:extLst>
   </p:cSld>
@@ -4393,6 +5064,460 @@
             <a:pPr marL="0" indent="0">
               <a:buNone/>
             </a:pPr>
+            <a:r>
+              <a:rPr lang="en-US" dirty="0" err="1" smtClean="0"/>
+              <a:t>Específicamente</a:t>
+            </a:r>
+            <a:r>
+              <a:rPr lang="en-US" dirty="0" smtClean="0"/>
+              <a:t>, lo </a:t>
+            </a:r>
+            <a:r>
+              <a:rPr lang="en-US" dirty="0" err="1" smtClean="0"/>
+              <a:t>que</a:t>
+            </a:r>
+            <a:r>
+              <a:rPr lang="en-US" dirty="0" smtClean="0"/>
+              <a:t> se </a:t>
+            </a:r>
+            <a:r>
+              <a:rPr lang="en-US" dirty="0" err="1" smtClean="0"/>
+              <a:t>reco</a:t>
+            </a:r>
+            <a:r>
+              <a:rPr lang="en-US" dirty="0" err="1" smtClean="0"/>
+              <a:t>mienda</a:t>
+            </a:r>
+            <a:r>
+              <a:rPr lang="en-US" dirty="0" smtClean="0"/>
+              <a:t> </a:t>
+            </a:r>
+            <a:r>
+              <a:rPr lang="en-US" dirty="0" err="1" smtClean="0"/>
+              <a:t>aprender</a:t>
+            </a:r>
+            <a:r>
+              <a:rPr lang="en-US" dirty="0" smtClean="0"/>
+              <a:t> </a:t>
+            </a:r>
+            <a:r>
+              <a:rPr lang="en-US" dirty="0" err="1" smtClean="0"/>
+              <a:t>sobre</a:t>
+            </a:r>
+            <a:r>
+              <a:rPr lang="en-US" dirty="0" smtClean="0"/>
+              <a:t> el </a:t>
+            </a:r>
+            <a:r>
+              <a:rPr lang="en-US" dirty="0" err="1" smtClean="0"/>
+              <a:t>usuario</a:t>
+            </a:r>
+            <a:r>
+              <a:rPr lang="en-US" dirty="0" smtClean="0"/>
+              <a:t> </a:t>
+            </a:r>
+            <a:r>
+              <a:rPr lang="en-US" dirty="0" err="1" smtClean="0"/>
+              <a:t>es</a:t>
+            </a:r>
+            <a:r>
+              <a:rPr lang="en-US" dirty="0" smtClean="0"/>
+              <a:t> lo </a:t>
+            </a:r>
+            <a:r>
+              <a:rPr lang="en-US" dirty="0" err="1" smtClean="0"/>
+              <a:t>siguiente</a:t>
+            </a:r>
+            <a:r>
+              <a:rPr lang="en-US" dirty="0" smtClean="0"/>
+              <a:t>:</a:t>
+            </a:r>
+          </a:p>
+          <a:p>
+            <a:pPr marL="0" indent="0">
+              <a:buNone/>
+            </a:pPr>
+            <a:r>
+              <a:rPr lang="es-CR" dirty="0" smtClean="0"/>
+              <a:t>• </a:t>
+            </a:r>
+            <a:r>
+              <a:rPr lang="es-CR" dirty="0"/>
+              <a:t>Las tareas específicas que se </a:t>
+            </a:r>
+            <a:r>
+              <a:rPr lang="es-CR" dirty="0" smtClean="0"/>
+              <a:t>realizan en </a:t>
+            </a:r>
+            <a:r>
+              <a:rPr lang="es-CR" dirty="0"/>
+              <a:t>la búsqueda de esos </a:t>
+            </a:r>
+            <a:r>
+              <a:rPr lang="es-CR" dirty="0" smtClean="0"/>
+              <a:t>objetivos.</a:t>
+            </a:r>
+            <a:endParaRPr lang="es-CR" dirty="0"/>
+          </a:p>
+          <a:p>
+            <a:pPr marL="0" indent="0">
+              <a:buNone/>
+            </a:pPr>
+            <a:r>
+              <a:rPr lang="es-CR" dirty="0"/>
+              <a:t>• El lenguaje y las palabras que utilizan para describir lo que están </a:t>
+            </a:r>
+            <a:r>
+              <a:rPr lang="es-CR" dirty="0" smtClean="0"/>
+              <a:t>haciendo.</a:t>
+            </a:r>
+            <a:endParaRPr lang="es-CR" dirty="0"/>
+          </a:p>
+          <a:p>
+            <a:pPr marL="0" indent="0">
+              <a:buNone/>
+            </a:pPr>
+            <a:r>
+              <a:rPr lang="es-CR" dirty="0"/>
+              <a:t>• Su habilidad en el uso de software similar a lo que usted está </a:t>
+            </a:r>
+            <a:r>
+              <a:rPr lang="es-CR" dirty="0" smtClean="0"/>
+              <a:t>diseñando.</a:t>
+            </a:r>
+            <a:endParaRPr lang="es-CR" dirty="0"/>
+          </a:p>
+          <a:p>
+            <a:pPr marL="0" indent="0">
+              <a:buNone/>
+            </a:pPr>
+            <a:r>
+              <a:rPr lang="es-CR" dirty="0"/>
+              <a:t>• Sus actitudes hacia el tipo de cosa que usted </a:t>
+            </a:r>
+            <a:r>
+              <a:rPr lang="es-CR" dirty="0" smtClean="0"/>
+              <a:t>esté diseñando</a:t>
+            </a:r>
+            <a:r>
+              <a:rPr lang="es-CR" dirty="0"/>
+              <a:t>, y cómo diferentes </a:t>
+            </a:r>
+            <a:r>
+              <a:rPr lang="es-CR" dirty="0" smtClean="0"/>
+              <a:t>diseños puedan </a:t>
+            </a:r>
+            <a:r>
+              <a:rPr lang="es-CR" dirty="0"/>
+              <a:t>afectar a dichas actitudes</a:t>
+            </a:r>
+            <a:endParaRPr lang="es-ES" dirty="0"/>
+          </a:p>
+        </p:txBody>
+      </p:sp>
+    </p:spTree>
+    <p:extLst>
+      <p:ext uri="{BB962C8B-B14F-4D97-AF65-F5344CB8AC3E}">
+        <p14:creationId xmlns:p14="http://schemas.microsoft.com/office/powerpoint/2010/main" val="2452590244"/>
+      </p:ext>
+    </p:extLst>
+  </p:cSld>
+  <p:clrMapOvr>
+    <a:masterClrMapping/>
+  </p:clrMapOvr>
+  <p:timing>
+    <p:tnLst>
+      <p:par>
+        <p:cTn id="1" dur="indefinite" restart="never" nodeType="tmRoot"/>
+      </p:par>
+    </p:tnLst>
+  </p:timing>
+</p:sld>
+</file>
+
+<file path=ppt/slides/slide22.xml><?xml version="1.0" encoding="utf-8"?>
+<p:sld xmlns:a="http://schemas.openxmlformats.org/drawingml/2006/main" xmlns:r="http://schemas.openxmlformats.org/officeDocument/2006/relationships" xmlns:p="http://schemas.openxmlformats.org/presentationml/2006/main">
+  <p:cSld>
+    <p:spTree>
+      <p:nvGrpSpPr>
+        <p:cNvPr id="1" name=""/>
+        <p:cNvGrpSpPr/>
+        <p:nvPr/>
+      </p:nvGrpSpPr>
+      <p:grpSpPr>
+        <a:xfrm>
+          <a:off x="0" y="0"/>
+          <a:ext cx="0" cy="0"/>
+          <a:chOff x="0" y="0"/>
+          <a:chExt cx="0" cy="0"/>
+        </a:xfrm>
+      </p:grpSpPr>
+      <p:sp>
+        <p:nvSpPr>
+          <p:cNvPr id="3" name="2 Marcador de contenido"/>
+          <p:cNvSpPr>
+            <a:spLocks noGrp="1"/>
+          </p:cNvSpPr>
+          <p:nvPr>
+            <p:ph idx="1"/>
+          </p:nvPr>
+        </p:nvSpPr>
+        <p:spPr>
+          <a:xfrm>
+            <a:off x="0" y="0"/>
+            <a:ext cx="9144000" cy="6858000"/>
+          </a:xfrm>
+        </p:spPr>
+        <p:txBody>
+          <a:bodyPr anchor="ctr"/>
+          <a:lstStyle/>
+          <a:p>
+            <a:pPr marL="0" indent="0">
+              <a:buNone/>
+            </a:pPr>
+            <a:r>
+              <a:rPr lang="en-US" dirty="0" err="1" smtClean="0"/>
+              <a:t>Herramientas</a:t>
+            </a:r>
+            <a:r>
+              <a:rPr lang="en-US" dirty="0" smtClean="0"/>
+              <a:t> </a:t>
+            </a:r>
+            <a:r>
+              <a:rPr lang="en-US" dirty="0" err="1" smtClean="0"/>
+              <a:t>para</a:t>
+            </a:r>
+            <a:r>
+              <a:rPr lang="en-US" dirty="0" smtClean="0"/>
+              <a:t> </a:t>
+            </a:r>
+            <a:r>
+              <a:rPr lang="en-US" dirty="0" err="1" smtClean="0"/>
+              <a:t>mejorar</a:t>
+            </a:r>
+            <a:r>
+              <a:rPr lang="en-US" dirty="0" smtClean="0"/>
+              <a:t> la </a:t>
+            </a:r>
+            <a:r>
+              <a:rPr lang="en-US" dirty="0" err="1" smtClean="0"/>
+              <a:t>investigación</a:t>
+            </a:r>
+            <a:r>
+              <a:rPr lang="en-US" dirty="0" smtClean="0"/>
+              <a:t> del </a:t>
+            </a:r>
+            <a:r>
+              <a:rPr lang="en-US" dirty="0" err="1" smtClean="0"/>
+              <a:t>usuario</a:t>
+            </a:r>
+            <a:r>
+              <a:rPr lang="en-US" dirty="0" smtClean="0"/>
+              <a:t>:</a:t>
+            </a:r>
+          </a:p>
+          <a:p>
+            <a:r>
+              <a:rPr lang="en-US" dirty="0" err="1" smtClean="0"/>
+              <a:t>Observación</a:t>
+            </a:r>
+            <a:r>
+              <a:rPr lang="en-US" dirty="0" smtClean="0"/>
+              <a:t> </a:t>
+            </a:r>
+            <a:r>
+              <a:rPr lang="en-US" dirty="0" err="1" smtClean="0"/>
+              <a:t>directa</a:t>
+            </a:r>
+            <a:r>
+              <a:rPr lang="en-US" dirty="0" smtClean="0"/>
+              <a:t>.</a:t>
+            </a:r>
+          </a:p>
+          <a:p>
+            <a:r>
+              <a:rPr lang="en-US" dirty="0" err="1" smtClean="0"/>
+              <a:t>Estudio</a:t>
+            </a:r>
+            <a:r>
+              <a:rPr lang="en-US" dirty="0" smtClean="0"/>
+              <a:t> de </a:t>
+            </a:r>
+            <a:r>
+              <a:rPr lang="en-US" dirty="0" err="1" smtClean="0"/>
+              <a:t>casos</a:t>
+            </a:r>
+            <a:r>
+              <a:rPr lang="en-US" dirty="0" smtClean="0"/>
+              <a:t>.</a:t>
+            </a:r>
+          </a:p>
+          <a:p>
+            <a:r>
+              <a:rPr lang="en-US" dirty="0" err="1" smtClean="0"/>
+              <a:t>Encuestas</a:t>
+            </a:r>
+            <a:r>
+              <a:rPr lang="en-US" dirty="0" smtClean="0"/>
+              <a:t>.</a:t>
+            </a:r>
+          </a:p>
+          <a:p>
+            <a:r>
+              <a:rPr lang="en-US" dirty="0" smtClean="0"/>
+              <a:t>Personas.</a:t>
+            </a:r>
+            <a:endParaRPr lang="en-US" dirty="0" smtClean="0"/>
+          </a:p>
+          <a:p>
+            <a:pPr marL="0" indent="0">
+              <a:buNone/>
+            </a:pPr>
+            <a:endParaRPr lang="es-ES" dirty="0"/>
+          </a:p>
+        </p:txBody>
+      </p:sp>
+    </p:spTree>
+    <p:extLst>
+      <p:ext uri="{BB962C8B-B14F-4D97-AF65-F5344CB8AC3E}">
+        <p14:creationId xmlns:p14="http://schemas.microsoft.com/office/powerpoint/2010/main" val="4061530428"/>
+      </p:ext>
+    </p:extLst>
+  </p:cSld>
+  <p:clrMapOvr>
+    <a:masterClrMapping/>
+  </p:clrMapOvr>
+  <p:timing>
+    <p:tnLst>
+      <p:par>
+        <p:cTn id="1" dur="indefinite" restart="never" nodeType="tmRoot"/>
+      </p:par>
+    </p:tnLst>
+  </p:timing>
+</p:sld>
+</file>
+
+<file path=ppt/slides/slide23.xml><?xml version="1.0" encoding="utf-8"?>
+<p:sld xmlns:a="http://schemas.openxmlformats.org/drawingml/2006/main" xmlns:r="http://schemas.openxmlformats.org/officeDocument/2006/relationships" xmlns:p="http://schemas.openxmlformats.org/presentationml/2006/main">
+  <p:cSld>
+    <p:spTree>
+      <p:nvGrpSpPr>
+        <p:cNvPr id="1" name=""/>
+        <p:cNvGrpSpPr/>
+        <p:nvPr/>
+      </p:nvGrpSpPr>
+      <p:grpSpPr>
+        <a:xfrm>
+          <a:off x="0" y="0"/>
+          <a:ext cx="0" cy="0"/>
+          <a:chOff x="0" y="0"/>
+          <a:chExt cx="0" cy="0"/>
+        </a:xfrm>
+      </p:grpSpPr>
+      <p:sp>
+        <p:nvSpPr>
+          <p:cNvPr id="3" name="2 Marcador de contenido"/>
+          <p:cNvSpPr>
+            <a:spLocks noGrp="1"/>
+          </p:cNvSpPr>
+          <p:nvPr>
+            <p:ph idx="1"/>
+          </p:nvPr>
+        </p:nvSpPr>
+        <p:spPr>
+          <a:xfrm>
+            <a:off x="0" y="0"/>
+            <a:ext cx="9144000" cy="6858000"/>
+          </a:xfrm>
+        </p:spPr>
+        <p:txBody>
+          <a:bodyPr anchor="ctr"/>
+          <a:lstStyle/>
+          <a:p>
+            <a:pPr marL="0" indent="0">
+              <a:buNone/>
+            </a:pPr>
+            <a:r>
+              <a:rPr lang="es-CR" dirty="0" smtClean="0"/>
+              <a:t>Se puede </a:t>
+            </a:r>
+            <a:r>
+              <a:rPr lang="es-CR" dirty="0"/>
+              <a:t>notar que algunos de estos métodos y temas, tales como entrevistas y </a:t>
+            </a:r>
+            <a:r>
+              <a:rPr lang="es-CR" dirty="0" smtClean="0"/>
+              <a:t>encuestas, suenan </a:t>
+            </a:r>
+            <a:r>
+              <a:rPr lang="es-CR" dirty="0"/>
+              <a:t>sospechosamente </a:t>
+            </a:r>
+            <a:r>
+              <a:rPr lang="es-CR" dirty="0" smtClean="0"/>
+              <a:t>como actividades </a:t>
+            </a:r>
+            <a:r>
+              <a:rPr lang="es-CR" dirty="0"/>
+              <a:t>de marketing. </a:t>
+            </a:r>
+            <a:r>
+              <a:rPr lang="es-CR" dirty="0" smtClean="0"/>
+              <a:t>Pues son exactamente eso. </a:t>
+            </a:r>
+          </a:p>
+          <a:p>
+            <a:pPr marL="0" indent="0">
+              <a:buNone/>
+            </a:pPr>
+            <a:r>
+              <a:rPr lang="es-CR" dirty="0" smtClean="0"/>
+              <a:t>Los </a:t>
+            </a:r>
+            <a:r>
+              <a:rPr lang="es-CR" dirty="0"/>
+              <a:t>grupos de </a:t>
+            </a:r>
+            <a:r>
+              <a:rPr lang="es-CR" dirty="0" smtClean="0"/>
+              <a:t>enfoque pueden </a:t>
+            </a:r>
+            <a:r>
+              <a:rPr lang="es-CR" dirty="0"/>
+              <a:t>ser </a:t>
+            </a:r>
+            <a:r>
+              <a:rPr lang="es-CR" dirty="0" smtClean="0"/>
+              <a:t>útiles, </a:t>
+            </a:r>
+            <a:r>
+              <a:rPr lang="es-CR" dirty="0"/>
+              <a:t>también (aunque no </a:t>
+            </a:r>
+            <a:r>
+              <a:rPr lang="es-CR" dirty="0" smtClean="0"/>
+              <a:t>tanto), </a:t>
+            </a:r>
+            <a:r>
+              <a:rPr lang="es-CR" dirty="0"/>
+              <a:t>y el concepto de segmentación del </a:t>
+            </a:r>
+            <a:r>
+              <a:rPr lang="es-CR" dirty="0" smtClean="0"/>
+              <a:t>mercado se </a:t>
+            </a:r>
+            <a:r>
+              <a:rPr lang="es-CR" dirty="0"/>
+              <a:t>asemeja a la definición del público objetivo aquí utilizados. En ambos casos, </a:t>
+            </a:r>
+            <a:r>
+              <a:rPr lang="es-CR" dirty="0" smtClean="0"/>
+              <a:t>el punto </a:t>
+            </a:r>
+            <a:r>
+              <a:rPr lang="es-CR" dirty="0"/>
+              <a:t>es entender a la audiencia lo mejor que pueda.</a:t>
+            </a:r>
             <a:endParaRPr lang="es-ES" dirty="0"/>
           </a:p>
         </p:txBody>
@@ -4417,6 +5542,172 @@
 </p:sld>
 </file>
 
+<file path=ppt/slides/slide24.xml><?xml version="1.0" encoding="utf-8"?>
+<p:sld xmlns:a="http://schemas.openxmlformats.org/drawingml/2006/main" xmlns:r="http://schemas.openxmlformats.org/officeDocument/2006/relationships" xmlns:p="http://schemas.openxmlformats.org/presentationml/2006/main">
+  <p:cSld>
+    <p:spTree>
+      <p:nvGrpSpPr>
+        <p:cNvPr id="1" name=""/>
+        <p:cNvGrpSpPr/>
+        <p:nvPr/>
+      </p:nvGrpSpPr>
+      <p:grpSpPr>
+        <a:xfrm>
+          <a:off x="0" y="0"/>
+          <a:ext cx="0" cy="0"/>
+          <a:chOff x="0" y="0"/>
+          <a:chExt cx="0" cy="0"/>
+        </a:xfrm>
+      </p:grpSpPr>
+      <p:sp>
+        <p:nvSpPr>
+          <p:cNvPr id="3" name="2 Marcador de contenido"/>
+          <p:cNvSpPr>
+            <a:spLocks noGrp="1"/>
+          </p:cNvSpPr>
+          <p:nvPr>
+            <p:ph idx="1"/>
+          </p:nvPr>
+        </p:nvSpPr>
+        <p:spPr>
+          <a:xfrm>
+            <a:off x="0" y="0"/>
+            <a:ext cx="9144000" cy="6858000"/>
+          </a:xfrm>
+        </p:spPr>
+        <p:txBody>
+          <a:bodyPr anchor="ctr">
+            <a:normAutofit/>
+          </a:bodyPr>
+          <a:lstStyle/>
+          <a:p>
+            <a:pPr marL="0" indent="0">
+              <a:buNone/>
+            </a:pPr>
+            <a:r>
+              <a:rPr lang="en-US" sz="7200" dirty="0" smtClean="0"/>
+              <a:t>La </a:t>
+            </a:r>
+            <a:r>
+              <a:rPr lang="en-US" sz="7200" dirty="0" err="1" smtClean="0"/>
+              <a:t>motivación</a:t>
+            </a:r>
+            <a:r>
+              <a:rPr lang="en-US" sz="7200" dirty="0" smtClean="0"/>
+              <a:t> del </a:t>
+            </a:r>
+            <a:r>
+              <a:rPr lang="en-US" sz="7200" dirty="0" err="1" smtClean="0"/>
+              <a:t>usuario</a:t>
+            </a:r>
+            <a:r>
+              <a:rPr lang="en-US" sz="7200" dirty="0" smtClean="0"/>
+              <a:t> </a:t>
+            </a:r>
+            <a:r>
+              <a:rPr lang="en-US" sz="7200" dirty="0" err="1" smtClean="0"/>
+              <a:t>por</a:t>
+            </a:r>
+            <a:r>
+              <a:rPr lang="en-US" sz="7200" dirty="0" smtClean="0"/>
+              <a:t> </a:t>
+            </a:r>
+            <a:r>
+              <a:rPr lang="en-US" sz="7200" dirty="0" err="1" smtClean="0"/>
+              <a:t>aprender</a:t>
+            </a:r>
+            <a:endParaRPr lang="es-ES" sz="7200" dirty="0"/>
+          </a:p>
+        </p:txBody>
+      </p:sp>
+    </p:spTree>
+    <p:extLst>
+      <p:ext uri="{BB962C8B-B14F-4D97-AF65-F5344CB8AC3E}">
+        <p14:creationId xmlns:p14="http://schemas.microsoft.com/office/powerpoint/2010/main" val="3848505118"/>
+      </p:ext>
+    </p:extLst>
+  </p:cSld>
+  <p:clrMapOvr>
+    <a:masterClrMapping/>
+  </p:clrMapOvr>
+  <p:timing>
+    <p:tnLst>
+      <p:par>
+        <p:cTn id="1" dur="indefinite" restart="never" nodeType="tmRoot"/>
+      </p:par>
+    </p:tnLst>
+  </p:timing>
+</p:sld>
+</file>
+
+<file path=ppt/slides/slide25.xml><?xml version="1.0" encoding="utf-8"?>
+<p:sld xmlns:a="http://schemas.openxmlformats.org/drawingml/2006/main" xmlns:r="http://schemas.openxmlformats.org/officeDocument/2006/relationships" xmlns:p="http://schemas.openxmlformats.org/presentationml/2006/main">
+  <p:cSld>
+    <p:spTree>
+      <p:nvGrpSpPr>
+        <p:cNvPr id="1" name=""/>
+        <p:cNvGrpSpPr/>
+        <p:nvPr/>
+      </p:nvGrpSpPr>
+      <p:grpSpPr>
+        <a:xfrm>
+          <a:off x="0" y="0"/>
+          <a:ext cx="0" cy="0"/>
+          <a:chOff x="0" y="0"/>
+          <a:chExt cx="0" cy="0"/>
+        </a:xfrm>
+      </p:grpSpPr>
+      <p:sp>
+        <p:nvSpPr>
+          <p:cNvPr id="2" name="1 Título"/>
+          <p:cNvSpPr>
+            <a:spLocks noGrp="1"/>
+          </p:cNvSpPr>
+          <p:nvPr>
+            <p:ph type="title"/>
+          </p:nvPr>
+        </p:nvSpPr>
+        <p:spPr/>
+        <p:txBody>
+          <a:bodyPr/>
+          <a:lstStyle/>
+          <a:p>
+            <a:endParaRPr lang="es-ES"/>
+          </a:p>
+        </p:txBody>
+      </p:sp>
+      <p:sp>
+        <p:nvSpPr>
+          <p:cNvPr id="3" name="2 Marcador de contenido"/>
+          <p:cNvSpPr>
+            <a:spLocks noGrp="1"/>
+          </p:cNvSpPr>
+          <p:nvPr>
+            <p:ph idx="1"/>
+          </p:nvPr>
+        </p:nvSpPr>
+        <p:spPr/>
+        <p:txBody>
+          <a:bodyPr/>
+          <a:lstStyle/>
+          <a:p>
+            <a:endParaRPr lang="es-ES"/>
+          </a:p>
+        </p:txBody>
+      </p:sp>
+    </p:spTree>
+    <p:extLst>
+      <p:ext uri="{BB962C8B-B14F-4D97-AF65-F5344CB8AC3E}">
+        <p14:creationId xmlns:p14="http://schemas.microsoft.com/office/powerpoint/2010/main" val="393653424"/>
+      </p:ext>
+    </p:extLst>
+  </p:cSld>
+  <p:clrMapOvr>
+    <a:masterClrMapping/>
+  </p:clrMapOvr>
+</p:sld>
+</file>
+
 <file path=ppt/slides/slide3.xml><?xml version="1.0" encoding="utf-8"?>
 <p:sld xmlns:a="http://schemas.openxmlformats.org/drawingml/2006/main" xmlns:r="http://schemas.openxmlformats.org/officeDocument/2006/relationships" xmlns:p="http://schemas.openxmlformats.org/presentationml/2006/main">
   <p:cSld>
@@ -4446,13 +5737,15 @@
         </p:nvSpPr>
         <p:spPr>
           <a:xfrm>
-            <a:off x="0" y="2348880"/>
-            <a:ext cx="9144000" cy="2160240"/>
+            <a:off x="0" y="0"/>
+            <a:ext cx="9144000" cy="6858000"/>
           </a:xfrm>
           <a:noFill/>
         </p:spPr>
         <p:txBody>
-          <a:bodyPr anchor="ctr"/>
+          <a:bodyPr anchor="ctr">
+            <a:normAutofit/>
+          </a:bodyPr>
           <a:lstStyle/>
           <a:p>
             <a:pPr marL="0" indent="0">
@@ -4460,7 +5753,37 @@
             </a:pPr>
             <a:r>
               <a:rPr lang="es-CR" dirty="0" smtClean="0"/>
-              <a:t>"Un buen diseño de interfaz, inicia con una buena comprensión de las personas, que es lo que les gusta, cual es el objetivo que tienen y como van a interactuar con la herramienta que estén utilizando"</a:t>
+              <a:t>"Un buen diseño de interfaz, inicia con una buena comprensión de las personas, que es lo que les </a:t>
+            </a:r>
+          </a:p>
+          <a:p>
+            <a:pPr marL="0" indent="0">
+              <a:buNone/>
+            </a:pPr>
+            <a:r>
+              <a:rPr lang="es-CR" dirty="0" smtClean="0"/>
+              <a:t>gusta, cual es el objetivo que tienen y como van </a:t>
+            </a:r>
+          </a:p>
+          <a:p>
+            <a:pPr marL="0" indent="0">
+              <a:buNone/>
+            </a:pPr>
+            <a:r>
+              <a:rPr lang="es-CR" dirty="0" smtClean="0"/>
+              <a:t>a interactuar con </a:t>
+            </a:r>
+            <a:r>
+              <a:rPr lang="es-CR" dirty="0" smtClean="0"/>
+              <a:t>lo que sea que </a:t>
+            </a:r>
+            <a:r>
+              <a:rPr lang="es-CR" dirty="0" smtClean="0"/>
+              <a:t>estén </a:t>
+            </a:r>
+            <a:r>
+              <a:rPr lang="es-CR" dirty="0" smtClean="0"/>
+              <a:t>usando"</a:t>
             </a:r>
             <a:endParaRPr lang="es-ES" dirty="0"/>
           </a:p>
@@ -4515,13 +5838,13 @@
         </p:nvSpPr>
         <p:spPr>
           <a:xfrm>
-            <a:off x="-9897" y="2708920"/>
-            <a:ext cx="7380312" cy="1440160"/>
+            <a:off x="-9898" y="0"/>
+            <a:ext cx="9153897" cy="6858000"/>
           </a:xfrm>
         </p:spPr>
         <p:txBody>
           <a:bodyPr anchor="ctr">
-            <a:normAutofit fontScale="92500" lnSpcReduction="10000"/>
+            <a:normAutofit/>
           </a:bodyPr>
           <a:lstStyle/>
           <a:p>
@@ -4585,18 +5908,24 @@
         </p:nvSpPr>
         <p:spPr>
           <a:xfrm>
-            <a:off x="0" y="-17031"/>
-            <a:ext cx="9144000" cy="6875031"/>
+            <a:off x="0" y="260648"/>
+            <a:ext cx="9144000" cy="1008112"/>
           </a:xfrm>
         </p:spPr>
         <p:txBody>
-          <a:bodyPr anchor="ctr"/>
+          <a:bodyPr anchor="ctr">
+            <a:noAutofit/>
+          </a:bodyPr>
           <a:lstStyle/>
           <a:p>
             <a:pPr marL="0" indent="0" algn="ctr">
               <a:buNone/>
             </a:pPr>
-            <a:endParaRPr lang="es-ES" dirty="0"/>
+            <a:r>
+              <a:rPr lang="en-US" sz="9600" dirty="0" err="1" smtClean="0"/>
+              <a:t>Interacción</a:t>
+            </a:r>
+            <a:endParaRPr lang="es-ES" sz="9600" dirty="0"/>
           </a:p>
         </p:txBody>
       </p:sp>
@@ -4623,7 +5952,7 @@
         </p:blipFill>
         <p:spPr bwMode="auto">
           <a:xfrm>
-            <a:off x="-4065" y="1772816"/>
+            <a:off x="0" y="1844824"/>
             <a:ext cx="9144000" cy="3616503"/>
           </a:xfrm>
           <a:prstGeom prst="rect">
@@ -4731,19 +6060,7 @@
             </a:pPr>
             <a:r>
               <a:rPr lang="es-CR" dirty="0" smtClean="0"/>
-              <a:t>"</a:t>
-            </a:r>
-            <a:r>
-              <a:rPr lang="es-CR" dirty="0" smtClean="0"/>
-              <a:t>guión</a:t>
-            </a:r>
-            <a:r>
-              <a:rPr lang="es-CR" dirty="0" smtClean="0"/>
-              <a:t>"</a:t>
-            </a:r>
-            <a:r>
-              <a:rPr lang="es-CR" dirty="0" smtClean="0"/>
-              <a:t> de esa conversación, o al menos definir los términos en los que se llevará a cabo.</a:t>
+              <a:t>"guión" de esa conversación, o al menos definir los términos en los que se llevará a cabo.</a:t>
             </a:r>
           </a:p>
         </p:txBody>
@@ -4828,7 +6145,7 @@
             </a:pPr>
             <a:r>
               <a:rPr lang="es-CR" dirty="0" smtClean="0"/>
-              <a:t>Cuales son los motivos e intenciones del el usuario y que vocabulario de palabras, iconos o gestos espera.</a:t>
+              <a:t>Cuales son los motivos e intenciones del usuario y que vocabulario de palabras, iconos o gestos espera.</a:t>
             </a:r>
             <a:endParaRPr lang="es-ES" dirty="0" smtClean="0"/>
           </a:p>
@@ -4861,6 +6178,122 @@
 </file>
 
 <file path=ppt/slides/slide8.xml><?xml version="1.0" encoding="utf-8"?>
+<p:sld xmlns:a="http://schemas.openxmlformats.org/drawingml/2006/main" xmlns:r="http://schemas.openxmlformats.org/officeDocument/2006/relationships" xmlns:p="http://schemas.openxmlformats.org/presentationml/2006/main">
+  <p:cSld>
+    <p:spTree>
+      <p:nvGrpSpPr>
+        <p:cNvPr id="1" name=""/>
+        <p:cNvGrpSpPr/>
+        <p:nvPr/>
+      </p:nvGrpSpPr>
+      <p:grpSpPr>
+        <a:xfrm>
+          <a:off x="0" y="0"/>
+          <a:ext cx="0" cy="0"/>
+          <a:chOff x="0" y="0"/>
+          <a:chExt cx="0" cy="0"/>
+        </a:xfrm>
+      </p:grpSpPr>
+      <p:pic>
+        <p:nvPicPr>
+          <p:cNvPr id="1026" name="Picture 2" descr="C:\Users\Holtlanf999\Desktop\f171f03f76ab4ee32f624e406c805f4b.jpg"/>
+          <p:cNvPicPr>
+            <a:picLocks noChangeAspect="1" noChangeArrowheads="1"/>
+          </p:cNvPicPr>
+          <p:nvPr/>
+        </p:nvPicPr>
+        <p:blipFill>
+          <a:blip r:embed="rId2">
+            <a:extLst>
+              <a:ext uri="{28A0092B-C50C-407E-A947-70E740481C1C}">
+                <a14:useLocalDpi xmlns:a14="http://schemas.microsoft.com/office/drawing/2010/main" val="0"/>
+              </a:ext>
+            </a:extLst>
+          </a:blip>
+          <a:srcRect/>
+          <a:stretch>
+            <a:fillRect/>
+          </a:stretch>
+        </p:blipFill>
+        <p:spPr bwMode="auto">
+          <a:xfrm>
+            <a:off x="-2218253" y="-868"/>
+            <a:ext cx="11362253" cy="7102276"/>
+          </a:xfrm>
+          <a:prstGeom prst="rect">
+            <a:avLst/>
+          </a:prstGeom>
+          <a:noFill/>
+          <a:extLst>
+            <a:ext uri="{909E8E84-426E-40DD-AFC4-6F175D3DCCD1}">
+              <a14:hiddenFill xmlns:a14="http://schemas.microsoft.com/office/drawing/2010/main">
+                <a:solidFill>
+                  <a:srgbClr val="FFFFFF"/>
+                </a:solidFill>
+              </a14:hiddenFill>
+            </a:ext>
+          </a:extLst>
+        </p:spPr>
+      </p:pic>
+      <p:sp>
+        <p:nvSpPr>
+          <p:cNvPr id="2" name="1 Título"/>
+          <p:cNvSpPr>
+            <a:spLocks noGrp="1"/>
+          </p:cNvSpPr>
+          <p:nvPr>
+            <p:ph type="title"/>
+          </p:nvPr>
+        </p:nvSpPr>
+        <p:spPr>
+          <a:xfrm>
+            <a:off x="-180528" y="260648"/>
+            <a:ext cx="9324528" cy="1143000"/>
+          </a:xfrm>
+        </p:spPr>
+        <p:txBody>
+          <a:bodyPr>
+            <a:noAutofit/>
+          </a:bodyPr>
+          <a:lstStyle/>
+          <a:p>
+            <a:r>
+              <a:rPr lang="en-US" sz="8000" dirty="0" err="1" smtClean="0"/>
+              <a:t>Pensamos</a:t>
+            </a:r>
+            <a:r>
+              <a:rPr lang="en-US" sz="8000" dirty="0" smtClean="0"/>
+              <a:t> </a:t>
+            </a:r>
+            <a:r>
+              <a:rPr lang="en-US" sz="8000" dirty="0" err="1" smtClean="0"/>
+              <a:t>Diferente</a:t>
+            </a:r>
+            <a:endParaRPr lang="es-ES" sz="8000" dirty="0"/>
+          </a:p>
+        </p:txBody>
+      </p:sp>
+    </p:spTree>
+    <p:extLst>
+      <p:ext uri="{BB962C8B-B14F-4D97-AF65-F5344CB8AC3E}">
+        <p14:creationId xmlns:p14="http://schemas.microsoft.com/office/powerpoint/2010/main" val="868754715"/>
+      </p:ext>
+    </p:extLst>
+  </p:cSld>
+  <p:clrMapOvr>
+    <a:masterClrMapping/>
+  </p:clrMapOvr>
+  <p:timing>
+    <p:tnLst>
+      <p:par>
+        <p:cTn id="1" dur="indefinite" restart="never" nodeType="tmRoot"/>
+      </p:par>
+    </p:tnLst>
+  </p:timing>
+</p:sld>
+</file>
+
+<file path=ppt/slides/slide9.xml><?xml version="1.0" encoding="utf-8"?>
 <p:sld xmlns:a="http://schemas.openxmlformats.org/drawingml/2006/main" xmlns:r="http://schemas.openxmlformats.org/officeDocument/2006/relationships" xmlns:p="http://schemas.openxmlformats.org/presentationml/2006/main">
   <p:cSld>
     <p:bg>
@@ -4897,23 +6330,29 @@
         </p:nvSpPr>
         <p:spPr>
           <a:xfrm>
-            <a:off x="0" y="3140968"/>
-            <a:ext cx="9144000" cy="648072"/>
+            <a:off x="0" y="0"/>
+            <a:ext cx="9144000" cy="6858000"/>
           </a:xfrm>
           <a:noFill/>
         </p:spPr>
         <p:txBody>
-          <a:bodyPr anchor="ctr"/>
+          <a:bodyPr anchor="ctr">
+            <a:noAutofit/>
+          </a:bodyPr>
           <a:lstStyle/>
           <a:p>
             <a:pPr marL="0" indent="0">
               <a:buNone/>
             </a:pPr>
             <a:r>
-              <a:rPr lang="es-CR" dirty="0" smtClean="0"/>
-              <a:t>Conoce tus usuarios , porque no son como tu! </a:t>
-            </a:r>
-            <a:endParaRPr lang="es-ES" dirty="0"/>
+              <a:rPr lang="es-CR" sz="4800" dirty="0" smtClean="0"/>
+              <a:t>Conoce a tus usuarios , porque no son como tu</a:t>
+            </a:r>
+            <a:r>
+              <a:rPr lang="es-CR" sz="4800" dirty="0" smtClean="0"/>
+              <a:t>!!! </a:t>
+            </a:r>
+            <a:endParaRPr lang="es-ES" sz="4800" dirty="0"/>
           </a:p>
         </p:txBody>
       </p:sp>
@@ -4921,165 +6360,6 @@
     <p:extLst>
       <p:ext uri="{BB962C8B-B14F-4D97-AF65-F5344CB8AC3E}">
         <p14:creationId xmlns:p14="http://schemas.microsoft.com/office/powerpoint/2010/main" val="1550801847"/>
-      </p:ext>
-    </p:extLst>
-  </p:cSld>
-  <p:clrMapOvr>
-    <a:masterClrMapping/>
-  </p:clrMapOvr>
-  <p:timing>
-    <p:tnLst>
-      <p:par>
-        <p:cTn id="1" dur="indefinite" restart="never" nodeType="tmRoot"/>
-      </p:par>
-    </p:tnLst>
-  </p:timing>
-</p:sld>
-</file>
-
-<file path=ppt/slides/slide9.xml><?xml version="1.0" encoding="utf-8"?>
-<p:sld xmlns:a="http://schemas.openxmlformats.org/drawingml/2006/main" xmlns:r="http://schemas.openxmlformats.org/officeDocument/2006/relationships" xmlns:p="http://schemas.openxmlformats.org/presentationml/2006/main">
-  <p:cSld>
-    <p:spTree>
-      <p:nvGrpSpPr>
-        <p:cNvPr id="1" name=""/>
-        <p:cNvGrpSpPr/>
-        <p:nvPr/>
-      </p:nvGrpSpPr>
-      <p:grpSpPr>
-        <a:xfrm>
-          <a:off x="0" y="0"/>
-          <a:ext cx="0" cy="0"/>
-          <a:chOff x="0" y="0"/>
-          <a:chExt cx="0" cy="0"/>
-        </a:xfrm>
-      </p:grpSpPr>
-      <p:sp>
-        <p:nvSpPr>
-          <p:cNvPr id="3" name="2 Marcador de contenido"/>
-          <p:cNvSpPr>
-            <a:spLocks noGrp="1"/>
-          </p:cNvSpPr>
-          <p:nvPr>
-            <p:ph idx="1"/>
-          </p:nvPr>
-        </p:nvSpPr>
-        <p:spPr>
-          <a:xfrm>
-            <a:off x="0" y="2636912"/>
-            <a:ext cx="9144000" cy="1368152"/>
-          </a:xfrm>
-          <a:noFill/>
-          <a:ln>
-            <a:noFill/>
-          </a:ln>
-        </p:spPr>
-        <p:txBody>
-          <a:bodyPr anchor="ctr">
-            <a:normAutofit/>
-          </a:bodyPr>
-          <a:lstStyle/>
-          <a:p>
-            <a:pPr marL="0" indent="0">
-              <a:buNone/>
-            </a:pPr>
-            <a:r>
-              <a:rPr lang="en-US" dirty="0" err="1" smtClean="0"/>
-              <a:t>Todos</a:t>
-            </a:r>
-            <a:r>
-              <a:rPr lang="en-US" dirty="0" smtClean="0"/>
-              <a:t> los </a:t>
-            </a:r>
-            <a:r>
-              <a:rPr lang="en-US" dirty="0" err="1" smtClean="0"/>
-              <a:t>que</a:t>
-            </a:r>
-            <a:r>
-              <a:rPr lang="en-US" dirty="0" smtClean="0"/>
-              <a:t> </a:t>
-            </a:r>
-            <a:r>
-              <a:rPr lang="en-US" dirty="0" err="1" smtClean="0"/>
-              <a:t>utilizamos</a:t>
-            </a:r>
-            <a:r>
-              <a:rPr lang="en-US" dirty="0" smtClean="0"/>
-              <a:t> </a:t>
-            </a:r>
-            <a:r>
-              <a:rPr lang="en-US" dirty="0" err="1" smtClean="0"/>
-              <a:t>una</a:t>
-            </a:r>
-            <a:r>
-              <a:rPr lang="en-US" dirty="0" smtClean="0"/>
-              <a:t> </a:t>
-            </a:r>
-            <a:r>
-              <a:rPr lang="en-US" dirty="0" err="1" smtClean="0"/>
-              <a:t>herramienta</a:t>
-            </a:r>
-            <a:r>
-              <a:rPr lang="en-US" dirty="0" smtClean="0"/>
-              <a:t> </a:t>
-            </a:r>
-            <a:r>
-              <a:rPr lang="en-US" dirty="0" err="1" smtClean="0"/>
-              <a:t>ya</a:t>
-            </a:r>
-            <a:r>
-              <a:rPr lang="en-US" dirty="0" smtClean="0"/>
-              <a:t> sea </a:t>
-            </a:r>
-          </a:p>
-          <a:p>
-            <a:pPr marL="0" indent="0">
-              <a:buNone/>
-            </a:pPr>
-            <a:r>
-              <a:rPr lang="en-US" dirty="0" smtClean="0"/>
-              <a:t>software o de </a:t>
-            </a:r>
-            <a:r>
-              <a:rPr lang="en-US" dirty="0" err="1" smtClean="0"/>
-              <a:t>otro</a:t>
-            </a:r>
-            <a:r>
-              <a:rPr lang="en-US" dirty="0" smtClean="0"/>
-              <a:t> </a:t>
-            </a:r>
-            <a:r>
-              <a:rPr lang="en-US" dirty="0" err="1" smtClean="0"/>
-              <a:t>tipo</a:t>
-            </a:r>
-            <a:r>
-              <a:rPr lang="en-US" dirty="0" smtClean="0"/>
-              <a:t>, lo </a:t>
-            </a:r>
-            <a:r>
-              <a:rPr lang="en-US" dirty="0" err="1" smtClean="0"/>
-              <a:t>hacemos</a:t>
-            </a:r>
-            <a:r>
-              <a:rPr lang="en-US" dirty="0" smtClean="0"/>
-              <a:t> con un </a:t>
-            </a:r>
-            <a:r>
-              <a:rPr lang="en-US" dirty="0" err="1" smtClean="0"/>
-              <a:t>motivo</a:t>
-            </a:r>
-            <a:r>
-              <a:rPr lang="en-US" dirty="0" smtClean="0"/>
-              <a:t>.</a:t>
-            </a:r>
-            <a:endParaRPr lang="es-ES" dirty="0" smtClean="0"/>
-          </a:p>
-        </p:txBody>
-      </p:sp>
-    </p:spTree>
-    <p:extLst>
-      <p:ext uri="{BB962C8B-B14F-4D97-AF65-F5344CB8AC3E}">
-        <p14:creationId xmlns:p14="http://schemas.microsoft.com/office/powerpoint/2010/main" val="4004824532"/>
       </p:ext>
     </p:extLst>
   </p:cSld>

</xml_diff>